<commit_message>
Improved MMSYN tutorial introduction and graphics
</commit_message>
<xml_diff>
--- a/doc/genome_scale_pipeline/genome_scale_pipeline.pptx
+++ b/doc/genome_scale_pipeline/genome_scale_pipeline.pptx
@@ -202,7 +202,7 @@
           </a:lstStyle>
           <a:p>
             <a:fld id="{49500105-9C48-984E-9CDC-F1375D25D7E6}" type="datetimeFigureOut">
-              <a:t>13/03/2025</a:t>
+              <a:t>02/06/2025</a:t>
             </a:fld>
             <a:endParaRPr lang="fr-FR"/>
           </a:p>
@@ -804,7 +804,7 @@
           <a:lstStyle/>
           <a:p>
             <a:fld id="{7017F4CF-FB7D-E643-B991-A4BE8CDC438F}" type="datetimeFigureOut">
-              <a:t>13/03/2025</a:t>
+              <a:t>02/06/2025</a:t>
             </a:fld>
             <a:endParaRPr lang="fr-FR"/>
           </a:p>
@@ -1000,7 +1000,7 @@
           <a:lstStyle/>
           <a:p>
             <a:fld id="{7017F4CF-FB7D-E643-B991-A4BE8CDC438F}" type="datetimeFigureOut">
-              <a:t>13/03/2025</a:t>
+              <a:t>02/06/2025</a:t>
             </a:fld>
             <a:endParaRPr lang="fr-FR"/>
           </a:p>
@@ -1206,7 +1206,7 @@
           <a:lstStyle/>
           <a:p>
             <a:fld id="{7017F4CF-FB7D-E643-B991-A4BE8CDC438F}" type="datetimeFigureOut">
-              <a:t>13/03/2025</a:t>
+              <a:t>02/06/2025</a:t>
             </a:fld>
             <a:endParaRPr lang="fr-FR"/>
           </a:p>
@@ -1402,7 +1402,7 @@
           <a:lstStyle/>
           <a:p>
             <a:fld id="{7017F4CF-FB7D-E643-B991-A4BE8CDC438F}" type="datetimeFigureOut">
-              <a:t>13/03/2025</a:t>
+              <a:t>02/06/2025</a:t>
             </a:fld>
             <a:endParaRPr lang="fr-FR"/>
           </a:p>
@@ -1675,7 +1675,7 @@
           <a:lstStyle/>
           <a:p>
             <a:fld id="{7017F4CF-FB7D-E643-B991-A4BE8CDC438F}" type="datetimeFigureOut">
-              <a:t>13/03/2025</a:t>
+              <a:t>02/06/2025</a:t>
             </a:fld>
             <a:endParaRPr lang="fr-FR"/>
           </a:p>
@@ -1938,7 +1938,7 @@
           <a:lstStyle/>
           <a:p>
             <a:fld id="{7017F4CF-FB7D-E643-B991-A4BE8CDC438F}" type="datetimeFigureOut">
-              <a:t>13/03/2025</a:t>
+              <a:t>02/06/2025</a:t>
             </a:fld>
             <a:endParaRPr lang="fr-FR"/>
           </a:p>
@@ -2348,7 +2348,7 @@
           <a:lstStyle/>
           <a:p>
             <a:fld id="{7017F4CF-FB7D-E643-B991-A4BE8CDC438F}" type="datetimeFigureOut">
-              <a:t>13/03/2025</a:t>
+              <a:t>02/06/2025</a:t>
             </a:fld>
             <a:endParaRPr lang="fr-FR"/>
           </a:p>
@@ -2487,7 +2487,7 @@
           <a:lstStyle/>
           <a:p>
             <a:fld id="{7017F4CF-FB7D-E643-B991-A4BE8CDC438F}" type="datetimeFigureOut">
-              <a:t>13/03/2025</a:t>
+              <a:t>02/06/2025</a:t>
             </a:fld>
             <a:endParaRPr lang="fr-FR"/>
           </a:p>
@@ -2598,7 +2598,7 @@
           <a:lstStyle/>
           <a:p>
             <a:fld id="{7017F4CF-FB7D-E643-B991-A4BE8CDC438F}" type="datetimeFigureOut">
-              <a:t>13/03/2025</a:t>
+              <a:t>02/06/2025</a:t>
             </a:fld>
             <a:endParaRPr lang="fr-FR"/>
           </a:p>
@@ -2907,7 +2907,7 @@
           <a:lstStyle/>
           <a:p>
             <a:fld id="{7017F4CF-FB7D-E643-B991-A4BE8CDC438F}" type="datetimeFigureOut">
-              <a:t>13/03/2025</a:t>
+              <a:t>02/06/2025</a:t>
             </a:fld>
             <a:endParaRPr lang="fr-FR"/>
           </a:p>
@@ -3193,7 +3193,7 @@
           <a:lstStyle/>
           <a:p>
             <a:fld id="{7017F4CF-FB7D-E643-B991-A4BE8CDC438F}" type="datetimeFigureOut">
-              <a:t>13/03/2025</a:t>
+              <a:t>02/06/2025</a:t>
             </a:fld>
             <a:endParaRPr lang="fr-FR"/>
           </a:p>
@@ -3432,7 +3432,7 @@
           </a:lstStyle>
           <a:p>
             <a:fld id="{7017F4CF-FB7D-E643-B991-A4BE8CDC438F}" type="datetimeFigureOut">
-              <a:t>13/03/2025</a:t>
+              <a:t>02/06/2025</a:t>
             </a:fld>
             <a:endParaRPr lang="fr-FR"/>
           </a:p>
@@ -7211,7 +7211,7 @@
           <a:p>
             <a:r>
               <a:rPr lang="fr-FR" sz="2000" b="1"/>
-              <a:t>Build GBA model</a:t>
+              <a:t>Build the CGM</a:t>
             </a:r>
           </a:p>
           <a:p>
@@ -8346,7 +8346,7 @@
           <a:p>
             <a:r>
               <a:rPr lang="fr-FR" sz="2000" b="1"/>
-              <a:t>Build GBA model</a:t>
+              <a:t>Build the CGM</a:t>
             </a:r>
           </a:p>
           <a:p>
@@ -8543,7 +8543,7 @@
           <a:p>
             <a:r>
               <a:rPr lang="fr-FR"/>
-              <a:t>• Reduce the GBA model</a:t>
+              <a:t>• Reduce the CGM</a:t>
             </a:r>
           </a:p>
           <a:p>
@@ -9646,7 +9646,7 @@
           <a:p>
             <a:r>
               <a:rPr lang="fr-FR" sz="2000" b="1"/>
-              <a:t>Build GBA model</a:t>
+              <a:t>Build the CGM</a:t>
             </a:r>
           </a:p>
           <a:p>
@@ -9843,7 +9843,7 @@
           <a:p>
             <a:r>
               <a:rPr lang="fr-FR"/>
-              <a:t>• Reduce the GBA model</a:t>
+              <a:t>• Reduce the CGM</a:t>
             </a:r>
           </a:p>
           <a:p>
@@ -10002,7 +10002,7 @@
           <a:p>
             <a:r>
               <a:rPr lang="fr-FR" sz="2000" b="1"/>
-              <a:t>GBA model</a:t>
+              <a:t>CGM</a:t>
             </a:r>
           </a:p>
         </p:txBody>
@@ -11103,7 +11103,7 @@
             <a:pPr algn="ctr"/>
             <a:r>
               <a:rPr lang="fr-FR" sz="2000" b="1"/>
-              <a:t>Build GBA model</a:t>
+              <a:t>Build the CGM</a:t>
             </a:r>
           </a:p>
         </p:txBody>
@@ -11400,7 +11400,7 @@
           <a:p>
             <a:r>
               <a:rPr lang="fr-FR" sz="2000" b="1"/>
-              <a:t>GBA model</a:t>
+              <a:t>CGM</a:t>
             </a:r>
           </a:p>
         </p:txBody>

</xml_diff>

<commit_message>
Re-organized MMSYN tutorial and genome-scale pipeline
</commit_message>
<xml_diff>
--- a/doc/genome_scale_pipeline/genome_scale_pipeline.pptx
+++ b/doc/genome_scale_pipeline/genome_scale_pipeline.pptx
@@ -11,9 +11,9 @@
     <p:sldId id="258" r:id="rId2"/>
     <p:sldId id="259" r:id="rId3"/>
     <p:sldId id="269" r:id="rId4"/>
-    <p:sldId id="265" r:id="rId5"/>
-    <p:sldId id="266" r:id="rId6"/>
-    <p:sldId id="267" r:id="rId7"/>
+    <p:sldId id="274" r:id="rId5"/>
+    <p:sldId id="273" r:id="rId6"/>
+    <p:sldId id="275" r:id="rId7"/>
     <p:sldId id="271" r:id="rId8"/>
   </p:sldIdLst>
   <p:sldSz cx="12192000" cy="6858000"/>
@@ -202,7 +202,7 @@
           </a:lstStyle>
           <a:p>
             <a:fld id="{49500105-9C48-984E-9CDC-F1375D25D7E6}" type="datetimeFigureOut">
-              <a:t>02/06/2025</a:t>
+              <a:t>21/06/2025</a:t>
             </a:fld>
             <a:endParaRPr lang="fr-FR"/>
           </a:p>
@@ -473,89 +473,6 @@
   <p:cSld>
     <p:spTree>
       <p:nvGrpSpPr>
-        <p:cNvPr id="1" name=""/>
-        <p:cNvGrpSpPr/>
-        <p:nvPr/>
-      </p:nvGrpSpPr>
-      <p:grpSpPr>
-        <a:xfrm>
-          <a:off x="0" y="0"/>
-          <a:ext cx="0" cy="0"/>
-          <a:chOff x="0" y="0"/>
-          <a:chExt cx="0" cy="0"/>
-        </a:xfrm>
-      </p:grpSpPr>
-      <p:sp>
-        <p:nvSpPr>
-          <p:cNvPr id="2" name="Espace réservé de l'image des diapositives 1"/>
-          <p:cNvSpPr>
-            <a:spLocks noGrp="1" noRot="1" noChangeAspect="1"/>
-          </p:cNvSpPr>
-          <p:nvPr>
-            <p:ph type="sldImg"/>
-          </p:nvPr>
-        </p:nvSpPr>
-        <p:spPr/>
-      </p:sp>
-      <p:sp>
-        <p:nvSpPr>
-          <p:cNvPr id="3" name="Espace réservé des notes 2"/>
-          <p:cNvSpPr>
-            <a:spLocks noGrp="1"/>
-          </p:cNvSpPr>
-          <p:nvPr>
-            <p:ph type="body" idx="1"/>
-          </p:nvPr>
-        </p:nvSpPr>
-        <p:spPr/>
-        <p:txBody>
-          <a:bodyPr/>
-          <a:lstStyle/>
-          <a:p>
-            <a:endParaRPr lang="fr-FR"/>
-          </a:p>
-        </p:txBody>
-      </p:sp>
-      <p:sp>
-        <p:nvSpPr>
-          <p:cNvPr id="4" name="Espace réservé du numéro de diapositive 3"/>
-          <p:cNvSpPr>
-            <a:spLocks noGrp="1"/>
-          </p:cNvSpPr>
-          <p:nvPr>
-            <p:ph type="sldNum" sz="quarter" idx="5"/>
-          </p:nvPr>
-        </p:nvSpPr>
-        <p:spPr/>
-        <p:txBody>
-          <a:bodyPr/>
-          <a:lstStyle/>
-          <a:p>
-            <a:fld id="{9FBF1E06-D5E6-D248-B45C-D8434899FAE8}" type="slidenum">
-              <a:t>6</a:t>
-            </a:fld>
-            <a:endParaRPr lang="fr-FR"/>
-          </a:p>
-        </p:txBody>
-      </p:sp>
-    </p:spTree>
-    <p:extLst>
-      <p:ext uri="{BB962C8B-B14F-4D97-AF65-F5344CB8AC3E}">
-        <p14:creationId xmlns:p14="http://schemas.microsoft.com/office/powerpoint/2010/main" val="947554946"/>
-      </p:ext>
-    </p:extLst>
-  </p:cSld>
-  <p:clrMapOvr>
-    <a:masterClrMapping/>
-  </p:clrMapOvr>
-</p:notes>
-</file>
-
-<file path=ppt/notesSlides/notesSlide2.xml><?xml version="1.0" encoding="utf-8"?>
-<p:notes xmlns:a="http://schemas.openxmlformats.org/drawingml/2006/main" xmlns:r="http://schemas.openxmlformats.org/officeDocument/2006/relationships" xmlns:p="http://schemas.openxmlformats.org/presentationml/2006/main">
-  <p:cSld>
-    <p:spTree>
-      <p:nvGrpSpPr>
         <p:cNvPr id="1" name="">
           <a:extLst>
             <a:ext uri="{FF2B5EF4-FFF2-40B4-BE49-F238E27FC236}">
@@ -804,7 +721,7 @@
           <a:lstStyle/>
           <a:p>
             <a:fld id="{7017F4CF-FB7D-E643-B991-A4BE8CDC438F}" type="datetimeFigureOut">
-              <a:t>02/06/2025</a:t>
+              <a:t>21/06/2025</a:t>
             </a:fld>
             <a:endParaRPr lang="fr-FR"/>
           </a:p>
@@ -1000,7 +917,7 @@
           <a:lstStyle/>
           <a:p>
             <a:fld id="{7017F4CF-FB7D-E643-B991-A4BE8CDC438F}" type="datetimeFigureOut">
-              <a:t>02/06/2025</a:t>
+              <a:t>21/06/2025</a:t>
             </a:fld>
             <a:endParaRPr lang="fr-FR"/>
           </a:p>
@@ -1206,7 +1123,7 @@
           <a:lstStyle/>
           <a:p>
             <a:fld id="{7017F4CF-FB7D-E643-B991-A4BE8CDC438F}" type="datetimeFigureOut">
-              <a:t>02/06/2025</a:t>
+              <a:t>21/06/2025</a:t>
             </a:fld>
             <a:endParaRPr lang="fr-FR"/>
           </a:p>
@@ -1402,7 +1319,7 @@
           <a:lstStyle/>
           <a:p>
             <a:fld id="{7017F4CF-FB7D-E643-B991-A4BE8CDC438F}" type="datetimeFigureOut">
-              <a:t>02/06/2025</a:t>
+              <a:t>21/06/2025</a:t>
             </a:fld>
             <a:endParaRPr lang="fr-FR"/>
           </a:p>
@@ -1675,7 +1592,7 @@
           <a:lstStyle/>
           <a:p>
             <a:fld id="{7017F4CF-FB7D-E643-B991-A4BE8CDC438F}" type="datetimeFigureOut">
-              <a:t>02/06/2025</a:t>
+              <a:t>21/06/2025</a:t>
             </a:fld>
             <a:endParaRPr lang="fr-FR"/>
           </a:p>
@@ -1938,7 +1855,7 @@
           <a:lstStyle/>
           <a:p>
             <a:fld id="{7017F4CF-FB7D-E643-B991-A4BE8CDC438F}" type="datetimeFigureOut">
-              <a:t>02/06/2025</a:t>
+              <a:t>21/06/2025</a:t>
             </a:fld>
             <a:endParaRPr lang="fr-FR"/>
           </a:p>
@@ -2348,7 +2265,7 @@
           <a:lstStyle/>
           <a:p>
             <a:fld id="{7017F4CF-FB7D-E643-B991-A4BE8CDC438F}" type="datetimeFigureOut">
-              <a:t>02/06/2025</a:t>
+              <a:t>21/06/2025</a:t>
             </a:fld>
             <a:endParaRPr lang="fr-FR"/>
           </a:p>
@@ -2487,7 +2404,7 @@
           <a:lstStyle/>
           <a:p>
             <a:fld id="{7017F4CF-FB7D-E643-B991-A4BE8CDC438F}" type="datetimeFigureOut">
-              <a:t>02/06/2025</a:t>
+              <a:t>21/06/2025</a:t>
             </a:fld>
             <a:endParaRPr lang="fr-FR"/>
           </a:p>
@@ -2598,7 +2515,7 @@
           <a:lstStyle/>
           <a:p>
             <a:fld id="{7017F4CF-FB7D-E643-B991-A4BE8CDC438F}" type="datetimeFigureOut">
-              <a:t>02/06/2025</a:t>
+              <a:t>21/06/2025</a:t>
             </a:fld>
             <a:endParaRPr lang="fr-FR"/>
           </a:p>
@@ -2907,7 +2824,7 @@
           <a:lstStyle/>
           <a:p>
             <a:fld id="{7017F4CF-FB7D-E643-B991-A4BE8CDC438F}" type="datetimeFigureOut">
-              <a:t>02/06/2025</a:t>
+              <a:t>21/06/2025</a:t>
             </a:fld>
             <a:endParaRPr lang="fr-FR"/>
           </a:p>
@@ -3193,7 +3110,7 @@
           <a:lstStyle/>
           <a:p>
             <a:fld id="{7017F4CF-FB7D-E643-B991-A4BE8CDC438F}" type="datetimeFigureOut">
-              <a:t>02/06/2025</a:t>
+              <a:t>21/06/2025</a:t>
             </a:fld>
             <a:endParaRPr lang="fr-FR"/>
           </a:p>
@@ -3432,7 +3349,7 @@
           </a:lstStyle>
           <a:p>
             <a:fld id="{7017F4CF-FB7D-E643-B991-A4BE8CDC438F}" type="datetimeFigureOut">
-              <a:t>02/06/2025</a:t>
+              <a:t>21/06/2025</a:t>
             </a:fld>
             <a:endParaRPr lang="fr-FR"/>
           </a:p>
@@ -6225,7 +6142,7 @@
         <p:cNvPr id="1" name="">
           <a:extLst>
             <a:ext uri="{FF2B5EF4-FFF2-40B4-BE49-F238E27FC236}">
-              <a16:creationId xmlns:a16="http://schemas.microsoft.com/office/drawing/2014/main" id="{F7184A89-F0B8-FC12-39B3-E1E67A6680BD}"/>
+              <a16:creationId xmlns:a16="http://schemas.microsoft.com/office/drawing/2014/main" id="{31C62F8D-C791-E2E7-F26E-51EAEB26CF4D}"/>
             </a:ext>
           </a:extLst>
         </p:cNvPr>
@@ -6245,7 +6162,7 @@
           <p:cNvPr id="19" name="Groupe 18">
             <a:extLst>
               <a:ext uri="{FF2B5EF4-FFF2-40B4-BE49-F238E27FC236}">
-                <a16:creationId xmlns:a16="http://schemas.microsoft.com/office/drawing/2014/main" id="{40DE80BD-4A3E-C5DF-8F96-36EC200B1005}"/>
+                <a16:creationId xmlns:a16="http://schemas.microsoft.com/office/drawing/2014/main" id="{41F3CBE2-500F-EBC6-B490-F58E827BCD19}"/>
               </a:ext>
             </a:extLst>
           </p:cNvPr>
@@ -6254,7 +6171,7 @@
         </p:nvGrpSpPr>
         <p:grpSpPr>
           <a:xfrm>
-            <a:off x="307445" y="1143508"/>
+            <a:off x="307445" y="1110850"/>
             <a:ext cx="752129" cy="891695"/>
             <a:chOff x="2533061" y="1897888"/>
             <a:chExt cx="752129" cy="891695"/>
@@ -6265,7 +6182,7 @@
             <p:cNvPr id="13" name="Picture 2" descr="New Document Office Paper Word Svg Png Icon Free Download (#511618) -  OnlineWebFonts.COM">
               <a:extLst>
                 <a:ext uri="{FF2B5EF4-FFF2-40B4-BE49-F238E27FC236}">
-                  <a16:creationId xmlns:a16="http://schemas.microsoft.com/office/drawing/2014/main" id="{B04F6B2A-035F-BE91-EB9A-DAD9C6F0B3BD}"/>
+                  <a16:creationId xmlns:a16="http://schemas.microsoft.com/office/drawing/2014/main" id="{1345F9FA-5805-EF10-18EC-B0830205DF75}"/>
                 </a:ext>
               </a:extLst>
             </p:cNvPr>
@@ -6310,7 +6227,7 @@
             <p:cNvPr id="16" name="ZoneTexte 15">
               <a:extLst>
                 <a:ext uri="{FF2B5EF4-FFF2-40B4-BE49-F238E27FC236}">
-                  <a16:creationId xmlns:a16="http://schemas.microsoft.com/office/drawing/2014/main" id="{C5086545-6D1F-CA4F-4229-12278555E891}"/>
+                  <a16:creationId xmlns:a16="http://schemas.microsoft.com/office/drawing/2014/main" id="{C7507462-DB91-ACAE-3973-C8D27FB93C87}"/>
                 </a:ext>
               </a:extLst>
             </p:cNvPr>
@@ -6347,7 +6264,7 @@
           <p:cNvPr id="21" name="Groupe 20">
             <a:extLst>
               <a:ext uri="{FF2B5EF4-FFF2-40B4-BE49-F238E27FC236}">
-                <a16:creationId xmlns:a16="http://schemas.microsoft.com/office/drawing/2014/main" id="{7488D557-B069-2A92-EC6D-94F8D5E38E87}"/>
+                <a16:creationId xmlns:a16="http://schemas.microsoft.com/office/drawing/2014/main" id="{A14C63B7-2BE1-CEF8-780B-FE5E27C1B837}"/>
               </a:ext>
             </a:extLst>
           </p:cNvPr>
@@ -6356,7 +6273,7 @@
         </p:nvGrpSpPr>
         <p:grpSpPr>
           <a:xfrm>
-            <a:off x="111075" y="3511586"/>
+            <a:off x="111075" y="3478928"/>
             <a:ext cx="1144865" cy="1168694"/>
             <a:chOff x="3801523" y="1897888"/>
             <a:chExt cx="1144865" cy="1168694"/>
@@ -6367,7 +6284,7 @@
             <p:cNvPr id="15" name="Picture 6" descr="Icônes, logos, symboles Folder– Téléchargement gratuit aux formats PNG et  SVG">
               <a:extLst>
                 <a:ext uri="{FF2B5EF4-FFF2-40B4-BE49-F238E27FC236}">
-                  <a16:creationId xmlns:a16="http://schemas.microsoft.com/office/drawing/2014/main" id="{4D779C87-D16B-CCF4-E72A-FFE933136AC5}"/>
+                  <a16:creationId xmlns:a16="http://schemas.microsoft.com/office/drawing/2014/main" id="{873B15BC-3959-196A-9C3C-B0E6A6F6FEA9}"/>
                 </a:ext>
               </a:extLst>
             </p:cNvPr>
@@ -6414,7 +6331,7 @@
             <p:cNvPr id="18" name="ZoneTexte 17">
               <a:extLst>
                 <a:ext uri="{FF2B5EF4-FFF2-40B4-BE49-F238E27FC236}">
-                  <a16:creationId xmlns:a16="http://schemas.microsoft.com/office/drawing/2014/main" id="{2C2A9856-1900-8C6B-1026-176F65B197C4}"/>
+                  <a16:creationId xmlns:a16="http://schemas.microsoft.com/office/drawing/2014/main" id="{7668BA24-CECC-3BB7-4B59-970C48D35BEC}"/>
                 </a:ext>
               </a:extLst>
             </p:cNvPr>
@@ -6458,7 +6375,7 @@
           <p:cNvPr id="22" name="Groupe 21">
             <a:extLst>
               <a:ext uri="{FF2B5EF4-FFF2-40B4-BE49-F238E27FC236}">
-                <a16:creationId xmlns:a16="http://schemas.microsoft.com/office/drawing/2014/main" id="{9E7E73F4-6EDC-247B-7D83-25E319DB59F8}"/>
+                <a16:creationId xmlns:a16="http://schemas.microsoft.com/office/drawing/2014/main" id="{4205E4AB-EF43-B2CD-EAD2-C6BAD7E87D89}"/>
               </a:ext>
             </a:extLst>
           </p:cNvPr>
@@ -6467,7 +6384,7 @@
         </p:nvGrpSpPr>
         <p:grpSpPr>
           <a:xfrm>
-            <a:off x="16820" y="2204351"/>
+            <a:off x="16820" y="2171693"/>
             <a:ext cx="1333378" cy="1168694"/>
             <a:chOff x="2242438" y="1897888"/>
             <a:chExt cx="1333378" cy="1168694"/>
@@ -6478,7 +6395,7 @@
             <p:cNvPr id="23" name="Picture 2" descr="New Document Office Paper Word Svg Png Icon Free Download (#511618) -  OnlineWebFonts.COM">
               <a:extLst>
                 <a:ext uri="{FF2B5EF4-FFF2-40B4-BE49-F238E27FC236}">
-                  <a16:creationId xmlns:a16="http://schemas.microsoft.com/office/drawing/2014/main" id="{24384CFE-5C68-60C4-96AD-56615FBC3849}"/>
+                  <a16:creationId xmlns:a16="http://schemas.microsoft.com/office/drawing/2014/main" id="{8D75A235-B575-8274-51C1-3508F2287EF2}"/>
                 </a:ext>
               </a:extLst>
             </p:cNvPr>
@@ -6523,7 +6440,7 @@
             <p:cNvPr id="24" name="ZoneTexte 23">
               <a:extLst>
                 <a:ext uri="{FF2B5EF4-FFF2-40B4-BE49-F238E27FC236}">
-                  <a16:creationId xmlns:a16="http://schemas.microsoft.com/office/drawing/2014/main" id="{8AEB1DC1-F226-36D1-33EF-F413AAC537E8}"/>
+                  <a16:creationId xmlns:a16="http://schemas.microsoft.com/office/drawing/2014/main" id="{D8757F88-93F8-057B-49D6-51AB8C984267}"/>
                 </a:ext>
               </a:extLst>
             </p:cNvPr>
@@ -6567,7 +6484,7 @@
           <p:cNvPr id="25" name="Groupe 24">
             <a:extLst>
               <a:ext uri="{FF2B5EF4-FFF2-40B4-BE49-F238E27FC236}">
-                <a16:creationId xmlns:a16="http://schemas.microsoft.com/office/drawing/2014/main" id="{2341DAF7-A620-48BD-E56C-74A6FFE0B76E}"/>
+                <a16:creationId xmlns:a16="http://schemas.microsoft.com/office/drawing/2014/main" id="{3F44C0C5-14E0-1207-8FBF-849AE1FDC27B}"/>
               </a:ext>
             </a:extLst>
           </p:cNvPr>
@@ -6576,7 +6493,7 @@
         </p:nvGrpSpPr>
         <p:grpSpPr>
           <a:xfrm>
-            <a:off x="178849" y="4805712"/>
+            <a:off x="178849" y="4773054"/>
             <a:ext cx="1009315" cy="1168694"/>
             <a:chOff x="3869299" y="1897888"/>
             <a:chExt cx="1009315" cy="1168694"/>
@@ -6587,7 +6504,7 @@
             <p:cNvPr id="26" name="Picture 6" descr="Icônes, logos, symboles Folder– Téléchargement gratuit aux formats PNG et  SVG">
               <a:extLst>
                 <a:ext uri="{FF2B5EF4-FFF2-40B4-BE49-F238E27FC236}">
-                  <a16:creationId xmlns:a16="http://schemas.microsoft.com/office/drawing/2014/main" id="{DEC8FDE9-8832-3E33-6CFF-39072E1ECB6A}"/>
+                  <a16:creationId xmlns:a16="http://schemas.microsoft.com/office/drawing/2014/main" id="{4E640305-54E3-EF5D-26CB-5C777ED787CB}"/>
                 </a:ext>
               </a:extLst>
             </p:cNvPr>
@@ -6634,7 +6551,7 @@
             <p:cNvPr id="27" name="ZoneTexte 26">
               <a:extLst>
                 <a:ext uri="{FF2B5EF4-FFF2-40B4-BE49-F238E27FC236}">
-                  <a16:creationId xmlns:a16="http://schemas.microsoft.com/office/drawing/2014/main" id="{6AF9E5B0-A488-0D32-DDE2-F464F52517A0}"/>
+                  <a16:creationId xmlns:a16="http://schemas.microsoft.com/office/drawing/2014/main" id="{9245C160-F441-21C3-69F8-788F42FCE70D}"/>
                 </a:ext>
               </a:extLst>
             </p:cNvPr>
@@ -6678,7 +6595,7 @@
           <p:cNvPr id="39" name="Accolade fermante 38">
             <a:extLst>
               <a:ext uri="{FF2B5EF4-FFF2-40B4-BE49-F238E27FC236}">
-                <a16:creationId xmlns:a16="http://schemas.microsoft.com/office/drawing/2014/main" id="{3DAA7EB8-4C3F-E2F3-36DE-E3D1AD538A9B}"/>
+                <a16:creationId xmlns:a16="http://schemas.microsoft.com/office/drawing/2014/main" id="{F855C42F-C7C7-945A-C96F-EAB35176338B}"/>
               </a:ext>
             </a:extLst>
           </p:cNvPr>
@@ -6687,7 +6604,7 @@
         </p:nvSpPr>
         <p:spPr>
           <a:xfrm>
-            <a:off x="1301811" y="1474608"/>
+            <a:off x="1301811" y="1441950"/>
             <a:ext cx="402590" cy="3691751"/>
           </a:xfrm>
           <a:prstGeom prst="rightBrace">
@@ -6725,7 +6642,7 @@
           <p:cNvPr id="40" name="Rectangle : coins arrondis 39">
             <a:extLst>
               <a:ext uri="{FF2B5EF4-FFF2-40B4-BE49-F238E27FC236}">
-                <a16:creationId xmlns:a16="http://schemas.microsoft.com/office/drawing/2014/main" id="{753DF449-5B11-F825-9B73-C8CFEF053A7B}"/>
+                <a16:creationId xmlns:a16="http://schemas.microsoft.com/office/drawing/2014/main" id="{90D4423E-9108-FC29-7220-E8071024CFCD}"/>
               </a:ext>
             </a:extLst>
           </p:cNvPr>
@@ -6734,7 +6651,7 @@
         </p:nvSpPr>
         <p:spPr>
           <a:xfrm>
-            <a:off x="1868835" y="1189237"/>
+            <a:off x="1868835" y="1211009"/>
             <a:ext cx="2463806" cy="1851152"/>
           </a:xfrm>
           <a:prstGeom prst="roundRect">
@@ -6805,7 +6722,7 @@
           <p:cNvPr id="42" name="ZoneTexte 41">
             <a:extLst>
               <a:ext uri="{FF2B5EF4-FFF2-40B4-BE49-F238E27FC236}">
-                <a16:creationId xmlns:a16="http://schemas.microsoft.com/office/drawing/2014/main" id="{AD121A9B-35B4-7C29-A650-390FCD58E80E}"/>
+                <a16:creationId xmlns:a16="http://schemas.microsoft.com/office/drawing/2014/main" id="{78CCD103-9C97-D41A-6956-443F041E390B}"/>
               </a:ext>
             </a:extLst>
           </p:cNvPr>
@@ -6814,7 +6731,7 @@
         </p:nvSpPr>
         <p:spPr>
           <a:xfrm>
-            <a:off x="9246646" y="800482"/>
+            <a:off x="9246646" y="822254"/>
             <a:ext cx="947695" cy="369332"/>
           </a:xfrm>
           <a:prstGeom prst="rect">
@@ -6847,7 +6764,7 @@
           <p:cNvPr id="4" name="Rectangle : coins arrondis 3">
             <a:extLst>
               <a:ext uri="{FF2B5EF4-FFF2-40B4-BE49-F238E27FC236}">
-                <a16:creationId xmlns:a16="http://schemas.microsoft.com/office/drawing/2014/main" id="{07CF8388-00E9-17FA-3917-14A562A85971}"/>
+                <a16:creationId xmlns:a16="http://schemas.microsoft.com/office/drawing/2014/main" id="{D0320FA8-EAB0-7A84-1BD0-7401C8D8E853}"/>
               </a:ext>
             </a:extLst>
           </p:cNvPr>
@@ -6856,7 +6773,7 @@
         </p:nvSpPr>
         <p:spPr>
           <a:xfrm>
-            <a:off x="4626429" y="1189236"/>
+            <a:off x="4626429" y="1211008"/>
             <a:ext cx="3308366" cy="1851152"/>
           </a:xfrm>
           <a:prstGeom prst="roundRect">
@@ -6921,7 +6838,7 @@
           <p:cNvPr id="5" name="ZoneTexte 4">
             <a:extLst>
               <a:ext uri="{FF2B5EF4-FFF2-40B4-BE49-F238E27FC236}">
-                <a16:creationId xmlns:a16="http://schemas.microsoft.com/office/drawing/2014/main" id="{45819ECF-BAE9-5B7C-AB03-7091382FFF16}"/>
+                <a16:creationId xmlns:a16="http://schemas.microsoft.com/office/drawing/2014/main" id="{93B18181-BAFE-25A2-E93F-92544E031C50}"/>
               </a:ext>
             </a:extLst>
           </p:cNvPr>
@@ -6930,7 +6847,7 @@
         </p:nvSpPr>
         <p:spPr>
           <a:xfrm>
-            <a:off x="5806764" y="800482"/>
+            <a:off x="5806764" y="822254"/>
             <a:ext cx="947695" cy="369332"/>
           </a:xfrm>
           <a:prstGeom prst="rect">
@@ -6963,7 +6880,7 @@
           <p:cNvPr id="2" name="Connecteur droit avec flèche 1">
             <a:extLst>
               <a:ext uri="{FF2B5EF4-FFF2-40B4-BE49-F238E27FC236}">
-                <a16:creationId xmlns:a16="http://schemas.microsoft.com/office/drawing/2014/main" id="{F6F3D09E-49CF-E12D-3161-71D73599F2C0}"/>
+                <a16:creationId xmlns:a16="http://schemas.microsoft.com/office/drawing/2014/main" id="{1627AA5A-40F1-DA91-6A59-9B08BCCE1EA8}"/>
               </a:ext>
             </a:extLst>
           </p:cNvPr>
@@ -6976,7 +6893,7 @@
         </p:nvCxnSpPr>
         <p:spPr>
           <a:xfrm flipV="1">
-            <a:off x="4332641" y="2114812"/>
+            <a:off x="4332641" y="2136584"/>
             <a:ext cx="293788" cy="1"/>
           </a:xfrm>
           <a:prstGeom prst="straightConnector1">
@@ -7006,7 +6923,7 @@
           <p:cNvPr id="28" name="Rectangle : coins arrondis 27">
             <a:extLst>
               <a:ext uri="{FF2B5EF4-FFF2-40B4-BE49-F238E27FC236}">
-                <a16:creationId xmlns:a16="http://schemas.microsoft.com/office/drawing/2014/main" id="{D2A53333-645A-2CB2-F6EC-50C8AEE88460}"/>
+                <a16:creationId xmlns:a16="http://schemas.microsoft.com/office/drawing/2014/main" id="{C9D1A8D4-6714-911E-D84F-E46DDF1D7934}"/>
               </a:ext>
             </a:extLst>
           </p:cNvPr>
@@ -7015,7 +6932,7 @@
         </p:nvSpPr>
         <p:spPr>
           <a:xfrm>
-            <a:off x="8228583" y="1189237"/>
+            <a:off x="8228583" y="1211009"/>
             <a:ext cx="2983823" cy="1851152"/>
           </a:xfrm>
           <a:prstGeom prst="roundRect">
@@ -7064,7 +6981,7 @@
           <a:p>
             <a:r>
               <a:rPr lang="fr-FR"/>
-              <a:t>• Delete pathways </a:t>
+              <a:t>• Delete pathways</a:t>
             </a:r>
           </a:p>
           <a:p>
@@ -7080,7 +6997,7 @@
           <p:cNvPr id="56" name="ZoneTexte 55">
             <a:extLst>
               <a:ext uri="{FF2B5EF4-FFF2-40B4-BE49-F238E27FC236}">
-                <a16:creationId xmlns:a16="http://schemas.microsoft.com/office/drawing/2014/main" id="{EEF69D9F-9B94-9893-D54B-6C3436E20ED0}"/>
+                <a16:creationId xmlns:a16="http://schemas.microsoft.com/office/drawing/2014/main" id="{25B8D301-F44E-92FE-ECF8-CE8DC19D52F8}"/>
               </a:ext>
             </a:extLst>
           </p:cNvPr>
@@ -7089,7 +7006,7 @@
         </p:nvSpPr>
         <p:spPr>
           <a:xfrm>
-            <a:off x="2626890" y="800482"/>
+            <a:off x="2626890" y="822254"/>
             <a:ext cx="947695" cy="369332"/>
           </a:xfrm>
           <a:prstGeom prst="rect">
@@ -7122,7 +7039,7 @@
           <p:cNvPr id="62" name="Connecteur droit avec flèche 61">
             <a:extLst>
               <a:ext uri="{FF2B5EF4-FFF2-40B4-BE49-F238E27FC236}">
-                <a16:creationId xmlns:a16="http://schemas.microsoft.com/office/drawing/2014/main" id="{2E6D8C83-4259-AF41-018A-8EE43C715D92}"/>
+                <a16:creationId xmlns:a16="http://schemas.microsoft.com/office/drawing/2014/main" id="{921F9A74-E7EA-8508-83B5-32F719EDFFEA}"/>
               </a:ext>
             </a:extLst>
           </p:cNvPr>
@@ -7135,7 +7052,7 @@
         </p:nvCxnSpPr>
         <p:spPr>
           <a:xfrm>
-            <a:off x="7934795" y="2114812"/>
+            <a:off x="7934795" y="2136584"/>
             <a:ext cx="293788" cy="1"/>
           </a:xfrm>
           <a:prstGeom prst="straightConnector1">
@@ -7160,12 +7077,99 @@
           </a:fontRef>
         </p:style>
       </p:cxnSp>
-      <p:sp>
-        <p:nvSpPr>
-          <p:cNvPr id="3" name="Rectangle : coins arrondis 2">
-            <a:extLst>
-              <a:ext uri="{FF2B5EF4-FFF2-40B4-BE49-F238E27FC236}">
-                <a16:creationId xmlns:a16="http://schemas.microsoft.com/office/drawing/2014/main" id="{B6223CD3-E8F7-2D12-A9AC-BE443C9598CC}"/>
+      <p:cxnSp>
+        <p:nvCxnSpPr>
+          <p:cNvPr id="6" name="Connecteur en angle 5">
+            <a:extLst>
+              <a:ext uri="{FF2B5EF4-FFF2-40B4-BE49-F238E27FC236}">
+                <a16:creationId xmlns:a16="http://schemas.microsoft.com/office/drawing/2014/main" id="{4F472E64-AD53-A701-2F26-18E3A3C12072}"/>
+              </a:ext>
+            </a:extLst>
+          </p:cNvPr>
+          <p:cNvCxnSpPr>
+            <a:cxnSpLocks/>
+            <a:stCxn id="28" idx="2"/>
+            <a:endCxn id="10" idx="0"/>
+          </p:cNvCxnSpPr>
+          <p:nvPr/>
+        </p:nvCxnSpPr>
+        <p:spPr>
+          <a:xfrm rot="5400000">
+            <a:off x="6294865" y="23615"/>
+            <a:ext cx="387085" cy="6464176"/>
+          </a:xfrm>
+          <a:prstGeom prst="bentConnector3">
+            <a:avLst>
+              <a:gd name="adj1" fmla="val 50000"/>
+            </a:avLst>
+          </a:prstGeom>
+          <a:ln w="19050">
+            <a:tailEnd type="triangle" w="lg" len="lg"/>
+          </a:ln>
+        </p:spPr>
+        <p:style>
+          <a:lnRef idx="1">
+            <a:schemeClr val="dk1"/>
+          </a:lnRef>
+          <a:fillRef idx="0">
+            <a:schemeClr val="dk1"/>
+          </a:fillRef>
+          <a:effectRef idx="0">
+            <a:schemeClr val="dk1"/>
+          </a:effectRef>
+          <a:fontRef idx="minor">
+            <a:schemeClr val="tx1"/>
+          </a:fontRef>
+        </p:style>
+      </p:cxnSp>
+      <p:sp>
+        <p:nvSpPr>
+          <p:cNvPr id="9" name="ZoneTexte 8">
+            <a:extLst>
+              <a:ext uri="{FF2B5EF4-FFF2-40B4-BE49-F238E27FC236}">
+                <a16:creationId xmlns:a16="http://schemas.microsoft.com/office/drawing/2014/main" id="{663677EB-A7D7-8D9D-219C-E1589FD0ACAC}"/>
+              </a:ext>
+            </a:extLst>
+          </p:cNvPr>
+          <p:cNvSpPr txBox="1"/>
+          <p:nvPr/>
+        </p:nvSpPr>
+        <p:spPr>
+          <a:xfrm>
+            <a:off x="2782470" y="5865941"/>
+            <a:ext cx="947695" cy="369332"/>
+          </a:xfrm>
+          <a:prstGeom prst="rect">
+            <a:avLst/>
+          </a:prstGeom>
+          <a:noFill/>
+        </p:spPr>
+        <p:txBody>
+          <a:bodyPr wrap="none" rtlCol="0">
+            <a:spAutoFit/>
+          </a:bodyPr>
+          <a:lstStyle/>
+          <a:p>
+            <a:pPr algn="ctr"/>
+            <a:r>
+              <a:rPr lang="fr-FR" b="1">
+                <a:solidFill>
+                  <a:schemeClr val="accent1"/>
+                </a:solidFill>
+                <a:latin typeface="Avenir Black" panose="02000503020000020003" pitchFamily="2" charset="0"/>
+                <a:cs typeface="Beirut" pitchFamily="2" charset="-78"/>
+              </a:rPr>
+              <a:t>STEP 4</a:t>
+            </a:r>
+          </a:p>
+        </p:txBody>
+      </p:sp>
+      <p:sp>
+        <p:nvSpPr>
+          <p:cNvPr id="10" name="Rectangle : coins arrondis 9">
+            <a:extLst>
+              <a:ext uri="{FF2B5EF4-FFF2-40B4-BE49-F238E27FC236}">
+                <a16:creationId xmlns:a16="http://schemas.microsoft.com/office/drawing/2014/main" id="{E52B205D-259C-0542-65AC-BE1C1C02F411}"/>
               </a:ext>
             </a:extLst>
           </p:cNvPr>
@@ -7174,8 +7178,8 @@
         </p:nvSpPr>
         <p:spPr>
           <a:xfrm>
-            <a:off x="1868835" y="3598859"/>
-            <a:ext cx="2774967" cy="2162841"/>
+            <a:off x="1868835" y="3449246"/>
+            <a:ext cx="2774967" cy="2388655"/>
           </a:xfrm>
           <a:prstGeom prst="roundRect">
             <a:avLst>
@@ -7211,130 +7215,19 @@
           <a:p>
             <a:r>
               <a:rPr lang="fr-FR" sz="2000" b="1"/>
-              <a:t>Build the CGM</a:t>
-            </a:r>
-          </a:p>
-          <a:p>
-            <a:r>
-              <a:rPr lang="fr-FR"/>
-              <a:t>• Check mass balance</a:t>
-            </a:r>
-          </a:p>
-          <a:p>
-            <a:r>
-              <a:rPr lang="fr-FR"/>
-              <a:t>• Ribosomal reaction</a:t>
-            </a:r>
-          </a:p>
-          <a:p>
-            <a:r>
-              <a:rPr lang="fr-FR"/>
-              <a:t>• Activation/inactivation</a:t>
-            </a:r>
-          </a:p>
-          <a:p>
-            <a:r>
-              <a:rPr lang="fr-FR"/>
-              <a:t>• External conditions</a:t>
-            </a:r>
-          </a:p>
-          <a:p>
-            <a:r>
-              <a:rPr lang="fr-FR"/>
-              <a:t>• Constant reactions</a:t>
-            </a:r>
-          </a:p>
-          <a:p>
-            <a:r>
-              <a:rPr lang="fr-FR"/>
-              <a:t>• Find initial solution</a:t>
-            </a:r>
-          </a:p>
-        </p:txBody>
-      </p:sp>
-      <p:cxnSp>
-        <p:nvCxnSpPr>
-          <p:cNvPr id="6" name="Connecteur en angle 5">
-            <a:extLst>
-              <a:ext uri="{FF2B5EF4-FFF2-40B4-BE49-F238E27FC236}">
-                <a16:creationId xmlns:a16="http://schemas.microsoft.com/office/drawing/2014/main" id="{07EC038D-AC70-3BF5-D64F-AAF0228ACF8C}"/>
-              </a:ext>
-            </a:extLst>
-          </p:cNvPr>
-          <p:cNvCxnSpPr>
-            <a:cxnSpLocks/>
-            <a:stCxn id="28" idx="2"/>
-            <a:endCxn id="3" idx="0"/>
-          </p:cNvCxnSpPr>
-          <p:nvPr/>
-        </p:nvCxnSpPr>
-        <p:spPr>
-          <a:xfrm rot="5400000">
-            <a:off x="6209172" y="87536"/>
-            <a:ext cx="558470" cy="6464176"/>
-          </a:xfrm>
-          <a:prstGeom prst="bentConnector3">
-            <a:avLst>
-              <a:gd name="adj1" fmla="val 50000"/>
-            </a:avLst>
-          </a:prstGeom>
-          <a:ln w="19050">
-            <a:tailEnd type="triangle" w="lg" len="lg"/>
-          </a:ln>
-        </p:spPr>
-        <p:style>
-          <a:lnRef idx="1">
-            <a:schemeClr val="dk1"/>
-          </a:lnRef>
-          <a:fillRef idx="0">
-            <a:schemeClr val="dk1"/>
-          </a:fillRef>
-          <a:effectRef idx="0">
-            <a:schemeClr val="dk1"/>
-          </a:effectRef>
-          <a:fontRef idx="minor">
-            <a:schemeClr val="tx1"/>
-          </a:fontRef>
-        </p:style>
-      </p:cxnSp>
-      <p:sp>
-        <p:nvSpPr>
-          <p:cNvPr id="9" name="ZoneTexte 8">
-            <a:extLst>
-              <a:ext uri="{FF2B5EF4-FFF2-40B4-BE49-F238E27FC236}">
-                <a16:creationId xmlns:a16="http://schemas.microsoft.com/office/drawing/2014/main" id="{326F74AB-1092-2B32-1CAF-8D4D392588D4}"/>
-              </a:ext>
-            </a:extLst>
-          </p:cNvPr>
-          <p:cNvSpPr txBox="1"/>
-          <p:nvPr/>
-        </p:nvSpPr>
-        <p:spPr>
-          <a:xfrm>
-            <a:off x="2782470" y="5789740"/>
-            <a:ext cx="947695" cy="369332"/>
-          </a:xfrm>
-          <a:prstGeom prst="rect">
-            <a:avLst/>
-          </a:prstGeom>
-          <a:noFill/>
-        </p:spPr>
-        <p:txBody>
-          <a:bodyPr wrap="none" rtlCol="0">
-            <a:spAutoFit/>
-          </a:bodyPr>
-          <a:lstStyle/>
-          <a:p>
-            <a:pPr algn="ctr"/>
-            <a:r>
-              <a:rPr lang="fr-FR" b="1">
-                <a:solidFill>
-                  <a:schemeClr val="accent1"/>
-                </a:solidFill>
-                <a:latin typeface="Avenir Black" panose="02000503020000020003" pitchFamily="2" charset="0"/>
-                <a:cs typeface="Beirut" pitchFamily="2" charset="-78"/>
-              </a:rPr>
-              <a:t>STEP 4</a:t>
+              <a:t>Reduce the model to a convex problem</a:t>
+            </a:r>
+          </a:p>
+          <a:p>
+            <a:r>
+              <a:rPr lang="fr-FR"/>
+              <a:t>• Find reference EFM</a:t>
+            </a:r>
+          </a:p>
+          <a:p>
+            <a:r>
+              <a:rPr lang="fr-FR"/>
+              <a:t>• Reduce the CGM</a:t>
             </a:r>
           </a:p>
         </p:txBody>
@@ -7342,7 +7235,7 @@
     </p:spTree>
     <p:extLst>
       <p:ext uri="{BB962C8B-B14F-4D97-AF65-F5344CB8AC3E}">
-        <p14:creationId xmlns:p14="http://schemas.microsoft.com/office/powerpoint/2010/main" val="1135371928"/>
+        <p14:creationId xmlns:p14="http://schemas.microsoft.com/office/powerpoint/2010/main" val="3085785918"/>
       </p:ext>
     </p:extLst>
   </p:cSld>
@@ -7360,7 +7253,7 @@
         <p:cNvPr id="1" name="">
           <a:extLst>
             <a:ext uri="{FF2B5EF4-FFF2-40B4-BE49-F238E27FC236}">
-              <a16:creationId xmlns:a16="http://schemas.microsoft.com/office/drawing/2014/main" id="{D6BC0413-D75B-D0FA-EC5E-A79D5693D3CD}"/>
+              <a16:creationId xmlns:a16="http://schemas.microsoft.com/office/drawing/2014/main" id="{A6F1D1BB-649A-B441-3847-BFD148EB7BA2}"/>
             </a:ext>
           </a:extLst>
         </p:cNvPr>
@@ -7380,7 +7273,7 @@
           <p:cNvPr id="19" name="Groupe 18">
             <a:extLst>
               <a:ext uri="{FF2B5EF4-FFF2-40B4-BE49-F238E27FC236}">
-                <a16:creationId xmlns:a16="http://schemas.microsoft.com/office/drawing/2014/main" id="{5CA697D5-921C-60BD-6052-765866C815AE}"/>
+                <a16:creationId xmlns:a16="http://schemas.microsoft.com/office/drawing/2014/main" id="{D02C4CCB-DE2B-0E9E-273D-09B97B0835EB}"/>
               </a:ext>
             </a:extLst>
           </p:cNvPr>
@@ -7389,7 +7282,7 @@
         </p:nvGrpSpPr>
         <p:grpSpPr>
           <a:xfrm>
-            <a:off x="307445" y="1143508"/>
+            <a:off x="307445" y="1110850"/>
             <a:ext cx="752129" cy="891695"/>
             <a:chOff x="2533061" y="1897888"/>
             <a:chExt cx="752129" cy="891695"/>
@@ -7400,7 +7293,7 @@
             <p:cNvPr id="13" name="Picture 2" descr="New Document Office Paper Word Svg Png Icon Free Download (#511618) -  OnlineWebFonts.COM">
               <a:extLst>
                 <a:ext uri="{FF2B5EF4-FFF2-40B4-BE49-F238E27FC236}">
-                  <a16:creationId xmlns:a16="http://schemas.microsoft.com/office/drawing/2014/main" id="{F66636B8-C895-5CFA-3C01-35A964A29EFF}"/>
+                  <a16:creationId xmlns:a16="http://schemas.microsoft.com/office/drawing/2014/main" id="{1DC5DBDF-B30D-ED59-ED9C-94B57F365A41}"/>
                 </a:ext>
               </a:extLst>
             </p:cNvPr>
@@ -7445,7 +7338,7 @@
             <p:cNvPr id="16" name="ZoneTexte 15">
               <a:extLst>
                 <a:ext uri="{FF2B5EF4-FFF2-40B4-BE49-F238E27FC236}">
-                  <a16:creationId xmlns:a16="http://schemas.microsoft.com/office/drawing/2014/main" id="{02C2F51C-CC5D-BBE3-5678-DA8064EE86FD}"/>
+                  <a16:creationId xmlns:a16="http://schemas.microsoft.com/office/drawing/2014/main" id="{EA949440-3424-6D8D-47F9-D1873CDE2F98}"/>
                 </a:ext>
               </a:extLst>
             </p:cNvPr>
@@ -7482,7 +7375,7 @@
           <p:cNvPr id="21" name="Groupe 20">
             <a:extLst>
               <a:ext uri="{FF2B5EF4-FFF2-40B4-BE49-F238E27FC236}">
-                <a16:creationId xmlns:a16="http://schemas.microsoft.com/office/drawing/2014/main" id="{E63E685C-132A-EC51-140A-083EA25286B5}"/>
+                <a16:creationId xmlns:a16="http://schemas.microsoft.com/office/drawing/2014/main" id="{8D566D03-92B2-C0D6-10F3-CC1500C377D6}"/>
               </a:ext>
             </a:extLst>
           </p:cNvPr>
@@ -7491,7 +7384,7 @@
         </p:nvGrpSpPr>
         <p:grpSpPr>
           <a:xfrm>
-            <a:off x="111075" y="3511586"/>
+            <a:off x="111075" y="3478928"/>
             <a:ext cx="1144865" cy="1168694"/>
             <a:chOff x="3801523" y="1897888"/>
             <a:chExt cx="1144865" cy="1168694"/>
@@ -7502,7 +7395,7 @@
             <p:cNvPr id="15" name="Picture 6" descr="Icônes, logos, symboles Folder– Téléchargement gratuit aux formats PNG et  SVG">
               <a:extLst>
                 <a:ext uri="{FF2B5EF4-FFF2-40B4-BE49-F238E27FC236}">
-                  <a16:creationId xmlns:a16="http://schemas.microsoft.com/office/drawing/2014/main" id="{CC67554C-7838-0637-CF90-51E18EB46DF6}"/>
+                  <a16:creationId xmlns:a16="http://schemas.microsoft.com/office/drawing/2014/main" id="{613FFB8E-46CD-6D03-2AF6-B812F964A79E}"/>
                 </a:ext>
               </a:extLst>
             </p:cNvPr>
@@ -7549,7 +7442,7 @@
             <p:cNvPr id="18" name="ZoneTexte 17">
               <a:extLst>
                 <a:ext uri="{FF2B5EF4-FFF2-40B4-BE49-F238E27FC236}">
-                  <a16:creationId xmlns:a16="http://schemas.microsoft.com/office/drawing/2014/main" id="{E6BC51AD-AA8A-D249-2832-BEBCEBA17971}"/>
+                  <a16:creationId xmlns:a16="http://schemas.microsoft.com/office/drawing/2014/main" id="{68900724-BD85-0D0A-691E-6CEB166D9DAC}"/>
                 </a:ext>
               </a:extLst>
             </p:cNvPr>
@@ -7593,7 +7486,7 @@
           <p:cNvPr id="22" name="Groupe 21">
             <a:extLst>
               <a:ext uri="{FF2B5EF4-FFF2-40B4-BE49-F238E27FC236}">
-                <a16:creationId xmlns:a16="http://schemas.microsoft.com/office/drawing/2014/main" id="{2E0BB94A-60E8-90B9-A47C-C06643138659}"/>
+                <a16:creationId xmlns:a16="http://schemas.microsoft.com/office/drawing/2014/main" id="{52547035-3D60-CE10-94F3-8CAC6BD5C13A}"/>
               </a:ext>
             </a:extLst>
           </p:cNvPr>
@@ -7602,7 +7495,7 @@
         </p:nvGrpSpPr>
         <p:grpSpPr>
           <a:xfrm>
-            <a:off x="16820" y="2204351"/>
+            <a:off x="16820" y="2171693"/>
             <a:ext cx="1333378" cy="1168694"/>
             <a:chOff x="2242438" y="1897888"/>
             <a:chExt cx="1333378" cy="1168694"/>
@@ -7613,7 +7506,7 @@
             <p:cNvPr id="23" name="Picture 2" descr="New Document Office Paper Word Svg Png Icon Free Download (#511618) -  OnlineWebFonts.COM">
               <a:extLst>
                 <a:ext uri="{FF2B5EF4-FFF2-40B4-BE49-F238E27FC236}">
-                  <a16:creationId xmlns:a16="http://schemas.microsoft.com/office/drawing/2014/main" id="{28E137A2-8072-E3A3-0E0D-EB06307DD24B}"/>
+                  <a16:creationId xmlns:a16="http://schemas.microsoft.com/office/drawing/2014/main" id="{013F1366-4C03-96EA-5BF7-31B36727243E}"/>
                 </a:ext>
               </a:extLst>
             </p:cNvPr>
@@ -7658,7 +7551,7 @@
             <p:cNvPr id="24" name="ZoneTexte 23">
               <a:extLst>
                 <a:ext uri="{FF2B5EF4-FFF2-40B4-BE49-F238E27FC236}">
-                  <a16:creationId xmlns:a16="http://schemas.microsoft.com/office/drawing/2014/main" id="{BEA1856C-75E3-BC6B-76A9-C6EFBD302713}"/>
+                  <a16:creationId xmlns:a16="http://schemas.microsoft.com/office/drawing/2014/main" id="{36BFF225-42E9-EBFB-FC3E-2CE4BE100897}"/>
                 </a:ext>
               </a:extLst>
             </p:cNvPr>
@@ -7702,7 +7595,7 @@
           <p:cNvPr id="25" name="Groupe 24">
             <a:extLst>
               <a:ext uri="{FF2B5EF4-FFF2-40B4-BE49-F238E27FC236}">
-                <a16:creationId xmlns:a16="http://schemas.microsoft.com/office/drawing/2014/main" id="{B8DA4165-6151-84F1-2E7A-025EA295E758}"/>
+                <a16:creationId xmlns:a16="http://schemas.microsoft.com/office/drawing/2014/main" id="{CBA5C388-7BF9-635C-2C2C-1F71E4F0A212}"/>
               </a:ext>
             </a:extLst>
           </p:cNvPr>
@@ -7711,7 +7604,7 @@
         </p:nvGrpSpPr>
         <p:grpSpPr>
           <a:xfrm>
-            <a:off x="178849" y="4805712"/>
+            <a:off x="178849" y="4773054"/>
             <a:ext cx="1009315" cy="1168694"/>
             <a:chOff x="3869299" y="1897888"/>
             <a:chExt cx="1009315" cy="1168694"/>
@@ -7722,7 +7615,7 @@
             <p:cNvPr id="26" name="Picture 6" descr="Icônes, logos, symboles Folder– Téléchargement gratuit aux formats PNG et  SVG">
               <a:extLst>
                 <a:ext uri="{FF2B5EF4-FFF2-40B4-BE49-F238E27FC236}">
-                  <a16:creationId xmlns:a16="http://schemas.microsoft.com/office/drawing/2014/main" id="{0B3F4A7F-D07E-E2A5-7DA9-20808D13CACA}"/>
+                  <a16:creationId xmlns:a16="http://schemas.microsoft.com/office/drawing/2014/main" id="{62B30B7A-676E-7A1D-1F4C-A74785524F37}"/>
                 </a:ext>
               </a:extLst>
             </p:cNvPr>
@@ -7769,7 +7662,7 @@
             <p:cNvPr id="27" name="ZoneTexte 26">
               <a:extLst>
                 <a:ext uri="{FF2B5EF4-FFF2-40B4-BE49-F238E27FC236}">
-                  <a16:creationId xmlns:a16="http://schemas.microsoft.com/office/drawing/2014/main" id="{4855C521-6998-AC62-6DE7-E99C86B273A7}"/>
+                  <a16:creationId xmlns:a16="http://schemas.microsoft.com/office/drawing/2014/main" id="{7CA5CE21-ED90-36AE-4890-D82F892BF6C2}"/>
                 </a:ext>
               </a:extLst>
             </p:cNvPr>
@@ -7813,7 +7706,7 @@
           <p:cNvPr id="39" name="Accolade fermante 38">
             <a:extLst>
               <a:ext uri="{FF2B5EF4-FFF2-40B4-BE49-F238E27FC236}">
-                <a16:creationId xmlns:a16="http://schemas.microsoft.com/office/drawing/2014/main" id="{C8106C80-2F87-6ECD-213C-F4B7FB4319AE}"/>
+                <a16:creationId xmlns:a16="http://schemas.microsoft.com/office/drawing/2014/main" id="{475B9EC7-4C1E-025C-61E2-8AE11D00F53E}"/>
               </a:ext>
             </a:extLst>
           </p:cNvPr>
@@ -7822,7 +7715,7 @@
         </p:nvSpPr>
         <p:spPr>
           <a:xfrm>
-            <a:off x="1301811" y="1474608"/>
+            <a:off x="1301811" y="1441950"/>
             <a:ext cx="402590" cy="3691751"/>
           </a:xfrm>
           <a:prstGeom prst="rightBrace">
@@ -7860,7 +7753,7 @@
           <p:cNvPr id="40" name="Rectangle : coins arrondis 39">
             <a:extLst>
               <a:ext uri="{FF2B5EF4-FFF2-40B4-BE49-F238E27FC236}">
-                <a16:creationId xmlns:a16="http://schemas.microsoft.com/office/drawing/2014/main" id="{113D59AF-9A65-DCC7-FF17-8D7DE46D1FED}"/>
+                <a16:creationId xmlns:a16="http://schemas.microsoft.com/office/drawing/2014/main" id="{6F6876EB-7188-C2EB-B838-9E3956AE9FAA}"/>
               </a:ext>
             </a:extLst>
           </p:cNvPr>
@@ -7869,7 +7762,7 @@
         </p:nvSpPr>
         <p:spPr>
           <a:xfrm>
-            <a:off x="1868835" y="1189237"/>
+            <a:off x="1868835" y="1211009"/>
             <a:ext cx="2463806" cy="1851152"/>
           </a:xfrm>
           <a:prstGeom prst="roundRect">
@@ -7940,7 +7833,7 @@
           <p:cNvPr id="42" name="ZoneTexte 41">
             <a:extLst>
               <a:ext uri="{FF2B5EF4-FFF2-40B4-BE49-F238E27FC236}">
-                <a16:creationId xmlns:a16="http://schemas.microsoft.com/office/drawing/2014/main" id="{65B25B25-99A7-0C74-E4CB-D247622BC692}"/>
+                <a16:creationId xmlns:a16="http://schemas.microsoft.com/office/drawing/2014/main" id="{90AAA325-2691-7306-C3A0-062AEA860449}"/>
               </a:ext>
             </a:extLst>
           </p:cNvPr>
@@ -7949,7 +7842,7 @@
         </p:nvSpPr>
         <p:spPr>
           <a:xfrm>
-            <a:off x="9246646" y="800482"/>
+            <a:off x="9246646" y="822254"/>
             <a:ext cx="947695" cy="369332"/>
           </a:xfrm>
           <a:prstGeom prst="rect">
@@ -7982,7 +7875,7 @@
           <p:cNvPr id="4" name="Rectangle : coins arrondis 3">
             <a:extLst>
               <a:ext uri="{FF2B5EF4-FFF2-40B4-BE49-F238E27FC236}">
-                <a16:creationId xmlns:a16="http://schemas.microsoft.com/office/drawing/2014/main" id="{67A64C99-633C-2F19-82DE-AFCC5B2B6516}"/>
+                <a16:creationId xmlns:a16="http://schemas.microsoft.com/office/drawing/2014/main" id="{60F0CEC5-5057-EA6A-9016-192DCF3992EB}"/>
               </a:ext>
             </a:extLst>
           </p:cNvPr>
@@ -7991,7 +7884,7 @@
         </p:nvSpPr>
         <p:spPr>
           <a:xfrm>
-            <a:off x="4626429" y="1189236"/>
+            <a:off x="4626429" y="1211008"/>
             <a:ext cx="3308366" cy="1851152"/>
           </a:xfrm>
           <a:prstGeom prst="roundRect">
@@ -8056,7 +7949,7 @@
           <p:cNvPr id="5" name="ZoneTexte 4">
             <a:extLst>
               <a:ext uri="{FF2B5EF4-FFF2-40B4-BE49-F238E27FC236}">
-                <a16:creationId xmlns:a16="http://schemas.microsoft.com/office/drawing/2014/main" id="{0BFA6C78-2219-130B-B2BE-F5508492CE7C}"/>
+                <a16:creationId xmlns:a16="http://schemas.microsoft.com/office/drawing/2014/main" id="{4C21D408-BFC4-3E8A-9DEB-3158ED5DC1FD}"/>
               </a:ext>
             </a:extLst>
           </p:cNvPr>
@@ -8065,7 +7958,7 @@
         </p:nvSpPr>
         <p:spPr>
           <a:xfrm>
-            <a:off x="5806764" y="800482"/>
+            <a:off x="5806764" y="822254"/>
             <a:ext cx="947695" cy="369332"/>
           </a:xfrm>
           <a:prstGeom prst="rect">
@@ -8098,7 +7991,7 @@
           <p:cNvPr id="2" name="Connecteur droit avec flèche 1">
             <a:extLst>
               <a:ext uri="{FF2B5EF4-FFF2-40B4-BE49-F238E27FC236}">
-                <a16:creationId xmlns:a16="http://schemas.microsoft.com/office/drawing/2014/main" id="{F00CF5D6-B448-3723-B68E-F1F4DF0CBF3C}"/>
+                <a16:creationId xmlns:a16="http://schemas.microsoft.com/office/drawing/2014/main" id="{A1BD20F9-0C2A-1FB6-3E15-4245E8B503BA}"/>
               </a:ext>
             </a:extLst>
           </p:cNvPr>
@@ -8111,7 +8004,7 @@
         </p:nvCxnSpPr>
         <p:spPr>
           <a:xfrm flipV="1">
-            <a:off x="4332641" y="2114812"/>
+            <a:off x="4332641" y="2136584"/>
             <a:ext cx="293788" cy="1"/>
           </a:xfrm>
           <a:prstGeom prst="straightConnector1">
@@ -8141,7 +8034,7 @@
           <p:cNvPr id="28" name="Rectangle : coins arrondis 27">
             <a:extLst>
               <a:ext uri="{FF2B5EF4-FFF2-40B4-BE49-F238E27FC236}">
-                <a16:creationId xmlns:a16="http://schemas.microsoft.com/office/drawing/2014/main" id="{03EBD3CD-9BB7-7407-8427-ABDC6B7C1E72}"/>
+                <a16:creationId xmlns:a16="http://schemas.microsoft.com/office/drawing/2014/main" id="{A062E146-D89C-5436-5043-3A1365BCBBB5}"/>
               </a:ext>
             </a:extLst>
           </p:cNvPr>
@@ -8150,7 +8043,7 @@
         </p:nvSpPr>
         <p:spPr>
           <a:xfrm>
-            <a:off x="8228583" y="1189237"/>
+            <a:off x="8228583" y="1211009"/>
             <a:ext cx="2983823" cy="1851152"/>
           </a:xfrm>
           <a:prstGeom prst="roundRect">
@@ -8215,7 +8108,7 @@
           <p:cNvPr id="56" name="ZoneTexte 55">
             <a:extLst>
               <a:ext uri="{FF2B5EF4-FFF2-40B4-BE49-F238E27FC236}">
-                <a16:creationId xmlns:a16="http://schemas.microsoft.com/office/drawing/2014/main" id="{018EDBE1-1A25-9434-F55C-7008EA021746}"/>
+                <a16:creationId xmlns:a16="http://schemas.microsoft.com/office/drawing/2014/main" id="{679ED548-0AD6-5EFB-6349-1DA0F610828C}"/>
               </a:ext>
             </a:extLst>
           </p:cNvPr>
@@ -8224,7 +8117,7 @@
         </p:nvSpPr>
         <p:spPr>
           <a:xfrm>
-            <a:off x="2626890" y="800482"/>
+            <a:off x="2626890" y="822254"/>
             <a:ext cx="947695" cy="369332"/>
           </a:xfrm>
           <a:prstGeom prst="rect">
@@ -8257,7 +8150,7 @@
           <p:cNvPr id="62" name="Connecteur droit avec flèche 61">
             <a:extLst>
               <a:ext uri="{FF2B5EF4-FFF2-40B4-BE49-F238E27FC236}">
-                <a16:creationId xmlns:a16="http://schemas.microsoft.com/office/drawing/2014/main" id="{908CFB70-A247-AD13-C09B-B85EB2DF4B97}"/>
+                <a16:creationId xmlns:a16="http://schemas.microsoft.com/office/drawing/2014/main" id="{B5677B17-A587-6947-9269-F78CEFD5E555}"/>
               </a:ext>
             </a:extLst>
           </p:cNvPr>
@@ -8270,7 +8163,7 @@
         </p:nvCxnSpPr>
         <p:spPr>
           <a:xfrm>
-            <a:off x="7934795" y="2114812"/>
+            <a:off x="7934795" y="2136584"/>
             <a:ext cx="293788" cy="1"/>
           </a:xfrm>
           <a:prstGeom prst="straightConnector1">
@@ -8295,12 +8188,99 @@
           </a:fontRef>
         </p:style>
       </p:cxnSp>
-      <p:sp>
-        <p:nvSpPr>
-          <p:cNvPr id="3" name="Rectangle : coins arrondis 2">
-            <a:extLst>
-              <a:ext uri="{FF2B5EF4-FFF2-40B4-BE49-F238E27FC236}">
-                <a16:creationId xmlns:a16="http://schemas.microsoft.com/office/drawing/2014/main" id="{924EDE0E-8049-A5A1-F725-D195214034C7}"/>
+      <p:cxnSp>
+        <p:nvCxnSpPr>
+          <p:cNvPr id="6" name="Connecteur en angle 5">
+            <a:extLst>
+              <a:ext uri="{FF2B5EF4-FFF2-40B4-BE49-F238E27FC236}">
+                <a16:creationId xmlns:a16="http://schemas.microsoft.com/office/drawing/2014/main" id="{B53EF776-65E4-5FAA-DE8B-D0955FC252E5}"/>
+              </a:ext>
+            </a:extLst>
+          </p:cNvPr>
+          <p:cNvCxnSpPr>
+            <a:cxnSpLocks/>
+            <a:stCxn id="28" idx="2"/>
+            <a:endCxn id="10" idx="0"/>
+          </p:cNvCxnSpPr>
+          <p:nvPr/>
+        </p:nvCxnSpPr>
+        <p:spPr>
+          <a:xfrm rot="5400000">
+            <a:off x="6294865" y="23615"/>
+            <a:ext cx="387085" cy="6464176"/>
+          </a:xfrm>
+          <a:prstGeom prst="bentConnector3">
+            <a:avLst>
+              <a:gd name="adj1" fmla="val 50000"/>
+            </a:avLst>
+          </a:prstGeom>
+          <a:ln w="19050">
+            <a:tailEnd type="triangle" w="lg" len="lg"/>
+          </a:ln>
+        </p:spPr>
+        <p:style>
+          <a:lnRef idx="1">
+            <a:schemeClr val="dk1"/>
+          </a:lnRef>
+          <a:fillRef idx="0">
+            <a:schemeClr val="dk1"/>
+          </a:fillRef>
+          <a:effectRef idx="0">
+            <a:schemeClr val="dk1"/>
+          </a:effectRef>
+          <a:fontRef idx="minor">
+            <a:schemeClr val="tx1"/>
+          </a:fontRef>
+        </p:style>
+      </p:cxnSp>
+      <p:sp>
+        <p:nvSpPr>
+          <p:cNvPr id="9" name="ZoneTexte 8">
+            <a:extLst>
+              <a:ext uri="{FF2B5EF4-FFF2-40B4-BE49-F238E27FC236}">
+                <a16:creationId xmlns:a16="http://schemas.microsoft.com/office/drawing/2014/main" id="{9EF25429-8795-CDDB-889B-AA91CA9756D8}"/>
+              </a:ext>
+            </a:extLst>
+          </p:cNvPr>
+          <p:cNvSpPr txBox="1"/>
+          <p:nvPr/>
+        </p:nvSpPr>
+        <p:spPr>
+          <a:xfrm>
+            <a:off x="2782470" y="5865941"/>
+            <a:ext cx="947695" cy="369332"/>
+          </a:xfrm>
+          <a:prstGeom prst="rect">
+            <a:avLst/>
+          </a:prstGeom>
+          <a:noFill/>
+        </p:spPr>
+        <p:txBody>
+          <a:bodyPr wrap="none" rtlCol="0">
+            <a:spAutoFit/>
+          </a:bodyPr>
+          <a:lstStyle/>
+          <a:p>
+            <a:pPr algn="ctr"/>
+            <a:r>
+              <a:rPr lang="fr-FR" b="1">
+                <a:solidFill>
+                  <a:schemeClr val="accent1"/>
+                </a:solidFill>
+                <a:latin typeface="Avenir Black" panose="02000503020000020003" pitchFamily="2" charset="0"/>
+                <a:cs typeface="Beirut" pitchFamily="2" charset="-78"/>
+              </a:rPr>
+              <a:t>STEP 4</a:t>
+            </a:r>
+          </a:p>
+        </p:txBody>
+      </p:sp>
+      <p:sp>
+        <p:nvSpPr>
+          <p:cNvPr id="7" name="Rectangle : coins arrondis 6">
+            <a:extLst>
+              <a:ext uri="{FF2B5EF4-FFF2-40B4-BE49-F238E27FC236}">
+                <a16:creationId xmlns:a16="http://schemas.microsoft.com/office/drawing/2014/main" id="{A9518BBC-268B-4449-9615-EA954502BCE6}"/>
               </a:ext>
             </a:extLst>
           </p:cNvPr>
@@ -8309,8 +8289,191 @@
         </p:nvSpPr>
         <p:spPr>
           <a:xfrm>
-            <a:off x="1868835" y="3598859"/>
-            <a:ext cx="2774967" cy="2162841"/>
+            <a:off x="4976309" y="3449246"/>
+            <a:ext cx="2774967" cy="2388655"/>
+          </a:xfrm>
+          <a:prstGeom prst="roundRect">
+            <a:avLst>
+              <a:gd name="adj" fmla="val 6902"/>
+            </a:avLst>
+          </a:prstGeom>
+          <a:ln/>
+          <a:effectLst>
+            <a:outerShdw blurRad="50800" dist="38100" dir="2700000" algn="tl" rotWithShape="0">
+              <a:prstClr val="black">
+                <a:alpha val="40000"/>
+              </a:prstClr>
+            </a:outerShdw>
+          </a:effectLst>
+        </p:spPr>
+        <p:style>
+          <a:lnRef idx="2">
+            <a:schemeClr val="dk1"/>
+          </a:lnRef>
+          <a:fillRef idx="1">
+            <a:schemeClr val="lt1"/>
+          </a:fillRef>
+          <a:effectRef idx="0">
+            <a:schemeClr val="dk1"/>
+          </a:effectRef>
+          <a:fontRef idx="minor">
+            <a:schemeClr val="dk1"/>
+          </a:fontRef>
+        </p:style>
+        <p:txBody>
+          <a:bodyPr rtlCol="0" anchor="ctr"/>
+          <a:lstStyle/>
+          <a:p>
+            <a:r>
+              <a:rPr lang="fr-FR" sz="2000" b="1"/>
+              <a:t>Build the CGM</a:t>
+            </a:r>
+          </a:p>
+          <a:p>
+            <a:r>
+              <a:rPr lang="fr-FR"/>
+              <a:t>• Check mass balance</a:t>
+            </a:r>
+          </a:p>
+          <a:p>
+            <a:r>
+              <a:rPr lang="fr-FR"/>
+              <a:t>• Convert units</a:t>
+            </a:r>
+          </a:p>
+          <a:p>
+            <a:r>
+              <a:rPr lang="fr-FR"/>
+              <a:t>• Ribosomal reaction</a:t>
+            </a:r>
+          </a:p>
+          <a:p>
+            <a:r>
+              <a:rPr lang="fr-FR"/>
+              <a:t>• Housekeeping proteins</a:t>
+            </a:r>
+          </a:p>
+          <a:p>
+            <a:r>
+              <a:rPr lang="fr-FR"/>
+              <a:t>• Activation/inactivation</a:t>
+            </a:r>
+          </a:p>
+          <a:p>
+            <a:r>
+              <a:rPr lang="fr-FR"/>
+              <a:t>• External conditions</a:t>
+            </a:r>
+          </a:p>
+          <a:p>
+            <a:r>
+              <a:rPr lang="fr-FR"/>
+              <a:t>• Find an initial solution</a:t>
+            </a:r>
+          </a:p>
+        </p:txBody>
+      </p:sp>
+      <p:cxnSp>
+        <p:nvCxnSpPr>
+          <p:cNvPr id="8" name="Connecteur droit avec flèche 7">
+            <a:extLst>
+              <a:ext uri="{FF2B5EF4-FFF2-40B4-BE49-F238E27FC236}">
+                <a16:creationId xmlns:a16="http://schemas.microsoft.com/office/drawing/2014/main" id="{1B1E1451-B799-9524-2C65-6FE48FE93034}"/>
+              </a:ext>
+            </a:extLst>
+          </p:cNvPr>
+          <p:cNvCxnSpPr>
+            <a:cxnSpLocks/>
+            <a:stCxn id="10" idx="3"/>
+            <a:endCxn id="7" idx="1"/>
+          </p:cNvCxnSpPr>
+          <p:nvPr/>
+        </p:nvCxnSpPr>
+        <p:spPr>
+          <a:xfrm>
+            <a:off x="4643802" y="4643574"/>
+            <a:ext cx="332507" cy="0"/>
+          </a:xfrm>
+          <a:prstGeom prst="straightConnector1">
+            <a:avLst/>
+          </a:prstGeom>
+          <a:ln>
+            <a:tailEnd type="triangle" w="lg" len="lg"/>
+          </a:ln>
+        </p:spPr>
+        <p:style>
+          <a:lnRef idx="2">
+            <a:schemeClr val="dk1"/>
+          </a:lnRef>
+          <a:fillRef idx="0">
+            <a:schemeClr val="dk1"/>
+          </a:fillRef>
+          <a:effectRef idx="1">
+            <a:schemeClr val="dk1"/>
+          </a:effectRef>
+          <a:fontRef idx="minor">
+            <a:schemeClr val="tx1"/>
+          </a:fontRef>
+        </p:style>
+      </p:cxnSp>
+      <p:sp>
+        <p:nvSpPr>
+          <p:cNvPr id="17" name="ZoneTexte 16">
+            <a:extLst>
+              <a:ext uri="{FF2B5EF4-FFF2-40B4-BE49-F238E27FC236}">
+                <a16:creationId xmlns:a16="http://schemas.microsoft.com/office/drawing/2014/main" id="{1BA6FF6E-C3FE-0E38-AAD2-9725AE8BDB53}"/>
+              </a:ext>
+            </a:extLst>
+          </p:cNvPr>
+          <p:cNvSpPr txBox="1"/>
+          <p:nvPr/>
+        </p:nvSpPr>
+        <p:spPr>
+          <a:xfrm>
+            <a:off x="5806764" y="5865941"/>
+            <a:ext cx="947695" cy="369332"/>
+          </a:xfrm>
+          <a:prstGeom prst="rect">
+            <a:avLst/>
+          </a:prstGeom>
+          <a:noFill/>
+        </p:spPr>
+        <p:txBody>
+          <a:bodyPr wrap="none" rtlCol="0">
+            <a:spAutoFit/>
+          </a:bodyPr>
+          <a:lstStyle/>
+          <a:p>
+            <a:pPr algn="ctr"/>
+            <a:r>
+              <a:rPr lang="fr-FR" b="1">
+                <a:solidFill>
+                  <a:schemeClr val="accent1"/>
+                </a:solidFill>
+                <a:latin typeface="Avenir Black" panose="02000503020000020003" pitchFamily="2" charset="0"/>
+                <a:cs typeface="Beirut" pitchFamily="2" charset="-78"/>
+              </a:rPr>
+              <a:t>STEP 5</a:t>
+            </a:r>
+          </a:p>
+        </p:txBody>
+      </p:sp>
+      <p:sp>
+        <p:nvSpPr>
+          <p:cNvPr id="10" name="Rectangle : coins arrondis 9">
+            <a:extLst>
+              <a:ext uri="{FF2B5EF4-FFF2-40B4-BE49-F238E27FC236}">
+                <a16:creationId xmlns:a16="http://schemas.microsoft.com/office/drawing/2014/main" id="{8BFA2F0D-248B-EF57-8404-BB2546899D17}"/>
+              </a:ext>
+            </a:extLst>
+          </p:cNvPr>
+          <p:cNvSpPr/>
+          <p:nvPr/>
+        </p:nvSpPr>
+        <p:spPr>
+          <a:xfrm>
+            <a:off x="1868835" y="3449246"/>
+            <a:ext cx="2774967" cy="2388655"/>
           </a:xfrm>
           <a:prstGeom prst="roundRect">
             <a:avLst>
@@ -8346,192 +8509,7 @@
           <a:p>
             <a:r>
               <a:rPr lang="fr-FR" sz="2000" b="1"/>
-              <a:t>Build the CGM</a:t>
-            </a:r>
-          </a:p>
-          <a:p>
-            <a:r>
-              <a:rPr lang="fr-FR"/>
-              <a:t>• Check mass balance</a:t>
-            </a:r>
-          </a:p>
-          <a:p>
-            <a:r>
-              <a:rPr lang="fr-FR"/>
-              <a:t>• Ribosomal reaction</a:t>
-            </a:r>
-          </a:p>
-          <a:p>
-            <a:r>
-              <a:rPr lang="fr-FR"/>
-              <a:t>• Activation/inactivation</a:t>
-            </a:r>
-          </a:p>
-          <a:p>
-            <a:r>
-              <a:rPr lang="fr-FR"/>
-              <a:t>• External conditions</a:t>
-            </a:r>
-          </a:p>
-          <a:p>
-            <a:r>
-              <a:rPr lang="fr-FR"/>
-              <a:t>• Constant reactions</a:t>
-            </a:r>
-          </a:p>
-          <a:p>
-            <a:r>
-              <a:rPr lang="fr-FR"/>
-              <a:t>• Find initial solution</a:t>
-            </a:r>
-          </a:p>
-        </p:txBody>
-      </p:sp>
-      <p:cxnSp>
-        <p:nvCxnSpPr>
-          <p:cNvPr id="6" name="Connecteur en angle 5">
-            <a:extLst>
-              <a:ext uri="{FF2B5EF4-FFF2-40B4-BE49-F238E27FC236}">
-                <a16:creationId xmlns:a16="http://schemas.microsoft.com/office/drawing/2014/main" id="{2725837E-5CCC-DF07-20F6-FCCC20776949}"/>
-              </a:ext>
-            </a:extLst>
-          </p:cNvPr>
-          <p:cNvCxnSpPr>
-            <a:cxnSpLocks/>
-            <a:stCxn id="28" idx="2"/>
-            <a:endCxn id="3" idx="0"/>
-          </p:cNvCxnSpPr>
-          <p:nvPr/>
-        </p:nvCxnSpPr>
-        <p:spPr>
-          <a:xfrm rot="5400000">
-            <a:off x="6209172" y="87536"/>
-            <a:ext cx="558470" cy="6464176"/>
-          </a:xfrm>
-          <a:prstGeom prst="bentConnector3">
-            <a:avLst>
-              <a:gd name="adj1" fmla="val 50000"/>
-            </a:avLst>
-          </a:prstGeom>
-          <a:ln w="19050">
-            <a:tailEnd type="triangle" w="lg" len="lg"/>
-          </a:ln>
-        </p:spPr>
-        <p:style>
-          <a:lnRef idx="1">
-            <a:schemeClr val="dk1"/>
-          </a:lnRef>
-          <a:fillRef idx="0">
-            <a:schemeClr val="dk1"/>
-          </a:fillRef>
-          <a:effectRef idx="0">
-            <a:schemeClr val="dk1"/>
-          </a:effectRef>
-          <a:fontRef idx="minor">
-            <a:schemeClr val="tx1"/>
-          </a:fontRef>
-        </p:style>
-      </p:cxnSp>
-      <p:sp>
-        <p:nvSpPr>
-          <p:cNvPr id="9" name="ZoneTexte 8">
-            <a:extLst>
-              <a:ext uri="{FF2B5EF4-FFF2-40B4-BE49-F238E27FC236}">
-                <a16:creationId xmlns:a16="http://schemas.microsoft.com/office/drawing/2014/main" id="{F72E00A6-26C4-DC14-0D35-808A2523D33C}"/>
-              </a:ext>
-            </a:extLst>
-          </p:cNvPr>
-          <p:cNvSpPr txBox="1"/>
-          <p:nvPr/>
-        </p:nvSpPr>
-        <p:spPr>
-          <a:xfrm>
-            <a:off x="2782470" y="5789740"/>
-            <a:ext cx="947695" cy="369332"/>
-          </a:xfrm>
-          <a:prstGeom prst="rect">
-            <a:avLst/>
-          </a:prstGeom>
-          <a:noFill/>
-        </p:spPr>
-        <p:txBody>
-          <a:bodyPr wrap="none" rtlCol="0">
-            <a:spAutoFit/>
-          </a:bodyPr>
-          <a:lstStyle/>
-          <a:p>
-            <a:pPr algn="ctr"/>
-            <a:r>
-              <a:rPr lang="fr-FR" b="1">
-                <a:solidFill>
-                  <a:schemeClr val="accent1"/>
-                </a:solidFill>
-                <a:latin typeface="Avenir Black" panose="02000503020000020003" pitchFamily="2" charset="0"/>
-                <a:cs typeface="Beirut" pitchFamily="2" charset="-78"/>
-              </a:rPr>
-              <a:t>STEP 4</a:t>
-            </a:r>
-          </a:p>
-        </p:txBody>
-      </p:sp>
-      <p:sp>
-        <p:nvSpPr>
-          <p:cNvPr id="7" name="Rectangle : coins arrondis 6">
-            <a:extLst>
-              <a:ext uri="{FF2B5EF4-FFF2-40B4-BE49-F238E27FC236}">
-                <a16:creationId xmlns:a16="http://schemas.microsoft.com/office/drawing/2014/main" id="{4DE4123B-6951-E663-62DB-3484A8668521}"/>
-              </a:ext>
-            </a:extLst>
-          </p:cNvPr>
-          <p:cNvSpPr/>
-          <p:nvPr/>
-        </p:nvSpPr>
-        <p:spPr>
-          <a:xfrm>
-            <a:off x="4976309" y="3598859"/>
-            <a:ext cx="2774967" cy="2162841"/>
-          </a:xfrm>
-          <a:prstGeom prst="roundRect">
-            <a:avLst>
-              <a:gd name="adj" fmla="val 8412"/>
-            </a:avLst>
-          </a:prstGeom>
-          <a:ln/>
-          <a:effectLst>
-            <a:outerShdw blurRad="50800" dist="38100" dir="2700000" algn="tl" rotWithShape="0">
-              <a:prstClr val="black">
-                <a:alpha val="40000"/>
-              </a:prstClr>
-            </a:outerShdw>
-          </a:effectLst>
-        </p:spPr>
-        <p:style>
-          <a:lnRef idx="2">
-            <a:schemeClr val="dk1"/>
-          </a:lnRef>
-          <a:fillRef idx="1">
-            <a:schemeClr val="lt1"/>
-          </a:fillRef>
-          <a:effectRef idx="0">
-            <a:schemeClr val="dk1"/>
-          </a:effectRef>
-          <a:fontRef idx="minor">
-            <a:schemeClr val="dk1"/>
-          </a:fontRef>
-        </p:style>
-        <p:txBody>
-          <a:bodyPr rtlCol="0" anchor="ctr"/>
-          <a:lstStyle/>
-          <a:p>
-            <a:r>
-              <a:rPr lang="fr-FR" sz="2000" b="1"/>
-              <a:t>Optional:</a:t>
-            </a:r>
-          </a:p>
-          <a:p>
-            <a:r>
-              <a:rPr lang="fr-FR" sz="2000" b="1"/>
-              <a:t>Reduce to full-column rank problem</a:t>
+              <a:t>Reduce the model to a convex problem</a:t>
             </a:r>
           </a:p>
           <a:p>
@@ -8544,97 +8522,6 @@
             <a:r>
               <a:rPr lang="fr-FR"/>
               <a:t>• Reduce the CGM</a:t>
-            </a:r>
-          </a:p>
-          <a:p>
-            <a:r>
-              <a:rPr lang="fr-FR"/>
-              <a:t>• Find initial solution</a:t>
-            </a:r>
-          </a:p>
-        </p:txBody>
-      </p:sp>
-      <p:cxnSp>
-        <p:nvCxnSpPr>
-          <p:cNvPr id="8" name="Connecteur droit avec flèche 7">
-            <a:extLst>
-              <a:ext uri="{FF2B5EF4-FFF2-40B4-BE49-F238E27FC236}">
-                <a16:creationId xmlns:a16="http://schemas.microsoft.com/office/drawing/2014/main" id="{ADF2341F-D30B-6DE0-B6EF-25D57D330E37}"/>
-              </a:ext>
-            </a:extLst>
-          </p:cNvPr>
-          <p:cNvCxnSpPr>
-            <a:cxnSpLocks/>
-            <a:stCxn id="3" idx="3"/>
-            <a:endCxn id="7" idx="1"/>
-          </p:cNvCxnSpPr>
-          <p:nvPr/>
-        </p:nvCxnSpPr>
-        <p:spPr>
-          <a:xfrm>
-            <a:off x="4643802" y="4680280"/>
-            <a:ext cx="332507" cy="0"/>
-          </a:xfrm>
-          <a:prstGeom prst="straightConnector1">
-            <a:avLst/>
-          </a:prstGeom>
-          <a:ln>
-            <a:tailEnd type="triangle" w="lg" len="lg"/>
-          </a:ln>
-        </p:spPr>
-        <p:style>
-          <a:lnRef idx="2">
-            <a:schemeClr val="dk1"/>
-          </a:lnRef>
-          <a:fillRef idx="0">
-            <a:schemeClr val="dk1"/>
-          </a:fillRef>
-          <a:effectRef idx="1">
-            <a:schemeClr val="dk1"/>
-          </a:effectRef>
-          <a:fontRef idx="minor">
-            <a:schemeClr val="tx1"/>
-          </a:fontRef>
-        </p:style>
-      </p:cxnSp>
-      <p:sp>
-        <p:nvSpPr>
-          <p:cNvPr id="17" name="ZoneTexte 16">
-            <a:extLst>
-              <a:ext uri="{FF2B5EF4-FFF2-40B4-BE49-F238E27FC236}">
-                <a16:creationId xmlns:a16="http://schemas.microsoft.com/office/drawing/2014/main" id="{D50B8AAF-7948-320B-DBA9-7557B3929A23}"/>
-              </a:ext>
-            </a:extLst>
-          </p:cNvPr>
-          <p:cNvSpPr txBox="1"/>
-          <p:nvPr/>
-        </p:nvSpPr>
-        <p:spPr>
-          <a:xfrm>
-            <a:off x="5806764" y="5789740"/>
-            <a:ext cx="947695" cy="369332"/>
-          </a:xfrm>
-          <a:prstGeom prst="rect">
-            <a:avLst/>
-          </a:prstGeom>
-          <a:noFill/>
-        </p:spPr>
-        <p:txBody>
-          <a:bodyPr wrap="none" rtlCol="0">
-            <a:spAutoFit/>
-          </a:bodyPr>
-          <a:lstStyle/>
-          <a:p>
-            <a:pPr algn="ctr"/>
-            <a:r>
-              <a:rPr lang="fr-FR" b="1">
-                <a:solidFill>
-                  <a:schemeClr val="accent1"/>
-                </a:solidFill>
-                <a:latin typeface="Avenir Black" panose="02000503020000020003" pitchFamily="2" charset="0"/>
-                <a:cs typeface="Beirut" pitchFamily="2" charset="-78"/>
-              </a:rPr>
-              <a:t>STEP 5</a:t>
             </a:r>
           </a:p>
         </p:txBody>
@@ -8642,7 +8529,7 @@
     </p:spTree>
     <p:extLst>
       <p:ext uri="{BB962C8B-B14F-4D97-AF65-F5344CB8AC3E}">
-        <p14:creationId xmlns:p14="http://schemas.microsoft.com/office/powerpoint/2010/main" val="4261855090"/>
+        <p14:creationId xmlns:p14="http://schemas.microsoft.com/office/powerpoint/2010/main" val="1308633443"/>
       </p:ext>
     </p:extLst>
   </p:cSld>
@@ -8660,7 +8547,7 @@
         <p:cNvPr id="1" name="">
           <a:extLst>
             <a:ext uri="{FF2B5EF4-FFF2-40B4-BE49-F238E27FC236}">
-              <a16:creationId xmlns:a16="http://schemas.microsoft.com/office/drawing/2014/main" id="{4DF430AF-E5B5-32B3-A7AA-EB8901CAD09E}"/>
+              <a16:creationId xmlns:a16="http://schemas.microsoft.com/office/drawing/2014/main" id="{73CEE4B4-3DA4-CEED-AA62-2DF29B12F7E3}"/>
             </a:ext>
           </a:extLst>
         </p:cNvPr>
@@ -8680,7 +8567,7 @@
           <p:cNvPr id="19" name="Groupe 18">
             <a:extLst>
               <a:ext uri="{FF2B5EF4-FFF2-40B4-BE49-F238E27FC236}">
-                <a16:creationId xmlns:a16="http://schemas.microsoft.com/office/drawing/2014/main" id="{D83E8E89-364F-485E-6D6D-13560492A8A9}"/>
+                <a16:creationId xmlns:a16="http://schemas.microsoft.com/office/drawing/2014/main" id="{85E9ACE8-9FF6-1AE0-D5DD-5E71D57029E8}"/>
               </a:ext>
             </a:extLst>
           </p:cNvPr>
@@ -8689,7 +8576,7 @@
         </p:nvGrpSpPr>
         <p:grpSpPr>
           <a:xfrm>
-            <a:off x="307445" y="1143508"/>
+            <a:off x="307445" y="1110850"/>
             <a:ext cx="752129" cy="891695"/>
             <a:chOff x="2533061" y="1897888"/>
             <a:chExt cx="752129" cy="891695"/>
@@ -8700,7 +8587,7 @@
             <p:cNvPr id="13" name="Picture 2" descr="New Document Office Paper Word Svg Png Icon Free Download (#511618) -  OnlineWebFonts.COM">
               <a:extLst>
                 <a:ext uri="{FF2B5EF4-FFF2-40B4-BE49-F238E27FC236}">
-                  <a16:creationId xmlns:a16="http://schemas.microsoft.com/office/drawing/2014/main" id="{B129A4F3-581C-BEEF-DDED-44FA862A1A46}"/>
+                  <a16:creationId xmlns:a16="http://schemas.microsoft.com/office/drawing/2014/main" id="{291D085F-8579-A26F-EAA9-E832E6B1D17C}"/>
                 </a:ext>
               </a:extLst>
             </p:cNvPr>
@@ -8710,7 +8597,7 @@
             <p:nvPr/>
           </p:nvPicPr>
           <p:blipFill rotWithShape="1">
-            <a:blip r:embed="rId3">
+            <a:blip r:embed="rId2">
               <a:extLst>
                 <a:ext uri="{28A0092B-C50C-407E-A947-70E740481C1C}">
                   <a14:useLocalDpi xmlns:a14="http://schemas.microsoft.com/office/drawing/2010/main" val="0"/>
@@ -8745,7 +8632,7 @@
             <p:cNvPr id="16" name="ZoneTexte 15">
               <a:extLst>
                 <a:ext uri="{FF2B5EF4-FFF2-40B4-BE49-F238E27FC236}">
-                  <a16:creationId xmlns:a16="http://schemas.microsoft.com/office/drawing/2014/main" id="{B564130A-AAA7-396C-6189-DFD2A618785D}"/>
+                  <a16:creationId xmlns:a16="http://schemas.microsoft.com/office/drawing/2014/main" id="{081B7978-B4A7-29E1-F4EA-235D046F8C9E}"/>
                 </a:ext>
               </a:extLst>
             </p:cNvPr>
@@ -8782,7 +8669,7 @@
           <p:cNvPr id="21" name="Groupe 20">
             <a:extLst>
               <a:ext uri="{FF2B5EF4-FFF2-40B4-BE49-F238E27FC236}">
-                <a16:creationId xmlns:a16="http://schemas.microsoft.com/office/drawing/2014/main" id="{B771AF2D-96BC-6B69-5C16-2DD1D7B6EFAE}"/>
+                <a16:creationId xmlns:a16="http://schemas.microsoft.com/office/drawing/2014/main" id="{52813DA8-3DEF-C3CC-8780-D380C62C3C94}"/>
               </a:ext>
             </a:extLst>
           </p:cNvPr>
@@ -8791,7 +8678,7 @@
         </p:nvGrpSpPr>
         <p:grpSpPr>
           <a:xfrm>
-            <a:off x="111075" y="3511586"/>
+            <a:off x="111075" y="3478928"/>
             <a:ext cx="1144865" cy="1168694"/>
             <a:chOff x="3801523" y="1897888"/>
             <a:chExt cx="1144865" cy="1168694"/>
@@ -8802,7 +8689,7 @@
             <p:cNvPr id="15" name="Picture 6" descr="Icônes, logos, symboles Folder– Téléchargement gratuit aux formats PNG et  SVG">
               <a:extLst>
                 <a:ext uri="{FF2B5EF4-FFF2-40B4-BE49-F238E27FC236}">
-                  <a16:creationId xmlns:a16="http://schemas.microsoft.com/office/drawing/2014/main" id="{7A21F802-20A3-9773-5F8E-A9B32A8C2C9A}"/>
+                  <a16:creationId xmlns:a16="http://schemas.microsoft.com/office/drawing/2014/main" id="{E7683B62-FF60-E496-05FA-EB934103A317}"/>
                 </a:ext>
               </a:extLst>
             </p:cNvPr>
@@ -8812,7 +8699,7 @@
             <p:nvPr/>
           </p:nvPicPr>
           <p:blipFill>
-            <a:blip r:embed="rId4">
+            <a:blip r:embed="rId3">
               <a:extLst>
                 <a:ext uri="{28A0092B-C50C-407E-A947-70E740481C1C}">
                   <a14:useLocalDpi xmlns:a14="http://schemas.microsoft.com/office/drawing/2010/main" val="0"/>
@@ -8849,7 +8736,7 @@
             <p:cNvPr id="18" name="ZoneTexte 17">
               <a:extLst>
                 <a:ext uri="{FF2B5EF4-FFF2-40B4-BE49-F238E27FC236}">
-                  <a16:creationId xmlns:a16="http://schemas.microsoft.com/office/drawing/2014/main" id="{00A812C2-D680-ADAD-5E84-EFEC9575E28F}"/>
+                  <a16:creationId xmlns:a16="http://schemas.microsoft.com/office/drawing/2014/main" id="{5793D54D-919C-5AD4-42A9-A49E58157238}"/>
                 </a:ext>
               </a:extLst>
             </p:cNvPr>
@@ -8893,7 +8780,7 @@
           <p:cNvPr id="22" name="Groupe 21">
             <a:extLst>
               <a:ext uri="{FF2B5EF4-FFF2-40B4-BE49-F238E27FC236}">
-                <a16:creationId xmlns:a16="http://schemas.microsoft.com/office/drawing/2014/main" id="{E0A57345-E4F2-F371-D307-A7458229001A}"/>
+                <a16:creationId xmlns:a16="http://schemas.microsoft.com/office/drawing/2014/main" id="{BFDE35E1-0805-C74B-DF83-44C34CC3E382}"/>
               </a:ext>
             </a:extLst>
           </p:cNvPr>
@@ -8902,7 +8789,7 @@
         </p:nvGrpSpPr>
         <p:grpSpPr>
           <a:xfrm>
-            <a:off x="16820" y="2204351"/>
+            <a:off x="16820" y="2171693"/>
             <a:ext cx="1333378" cy="1168694"/>
             <a:chOff x="2242438" y="1897888"/>
             <a:chExt cx="1333378" cy="1168694"/>
@@ -8913,7 +8800,7 @@
             <p:cNvPr id="23" name="Picture 2" descr="New Document Office Paper Word Svg Png Icon Free Download (#511618) -  OnlineWebFonts.COM">
               <a:extLst>
                 <a:ext uri="{FF2B5EF4-FFF2-40B4-BE49-F238E27FC236}">
-                  <a16:creationId xmlns:a16="http://schemas.microsoft.com/office/drawing/2014/main" id="{8FC65376-BBF9-4896-DE8B-7699B93A3C07}"/>
+                  <a16:creationId xmlns:a16="http://schemas.microsoft.com/office/drawing/2014/main" id="{45B56662-B991-46E4-8F4E-A29D096E72CB}"/>
                 </a:ext>
               </a:extLst>
             </p:cNvPr>
@@ -8923,7 +8810,7 @@
             <p:nvPr/>
           </p:nvPicPr>
           <p:blipFill rotWithShape="1">
-            <a:blip r:embed="rId3">
+            <a:blip r:embed="rId2">
               <a:extLst>
                 <a:ext uri="{28A0092B-C50C-407E-A947-70E740481C1C}">
                   <a14:useLocalDpi xmlns:a14="http://schemas.microsoft.com/office/drawing/2010/main" val="0"/>
@@ -8958,7 +8845,7 @@
             <p:cNvPr id="24" name="ZoneTexte 23">
               <a:extLst>
                 <a:ext uri="{FF2B5EF4-FFF2-40B4-BE49-F238E27FC236}">
-                  <a16:creationId xmlns:a16="http://schemas.microsoft.com/office/drawing/2014/main" id="{3DC4CB14-DD8B-C161-333F-546B0D4476F8}"/>
+                  <a16:creationId xmlns:a16="http://schemas.microsoft.com/office/drawing/2014/main" id="{2CBB6276-5F9C-0841-0717-34450C34CF40}"/>
                 </a:ext>
               </a:extLst>
             </p:cNvPr>
@@ -9002,7 +8889,7 @@
           <p:cNvPr id="25" name="Groupe 24">
             <a:extLst>
               <a:ext uri="{FF2B5EF4-FFF2-40B4-BE49-F238E27FC236}">
-                <a16:creationId xmlns:a16="http://schemas.microsoft.com/office/drawing/2014/main" id="{CE8CD878-C9D2-E4A6-E442-9DA1B74579F2}"/>
+                <a16:creationId xmlns:a16="http://schemas.microsoft.com/office/drawing/2014/main" id="{8D3F6E71-84E5-43A7-4A3C-117EC950F568}"/>
               </a:ext>
             </a:extLst>
           </p:cNvPr>
@@ -9011,7 +8898,7 @@
         </p:nvGrpSpPr>
         <p:grpSpPr>
           <a:xfrm>
-            <a:off x="178849" y="4805712"/>
+            <a:off x="178849" y="4773054"/>
             <a:ext cx="1009315" cy="1168694"/>
             <a:chOff x="3869299" y="1897888"/>
             <a:chExt cx="1009315" cy="1168694"/>
@@ -9022,7 +8909,7 @@
             <p:cNvPr id="26" name="Picture 6" descr="Icônes, logos, symboles Folder– Téléchargement gratuit aux formats PNG et  SVG">
               <a:extLst>
                 <a:ext uri="{FF2B5EF4-FFF2-40B4-BE49-F238E27FC236}">
-                  <a16:creationId xmlns:a16="http://schemas.microsoft.com/office/drawing/2014/main" id="{327212A1-3E08-3DB5-E5C8-642FCA721461}"/>
+                  <a16:creationId xmlns:a16="http://schemas.microsoft.com/office/drawing/2014/main" id="{90C1CAC8-9921-6B06-412F-ACC57B27EB3E}"/>
                 </a:ext>
               </a:extLst>
             </p:cNvPr>
@@ -9032,7 +8919,7 @@
             <p:nvPr/>
           </p:nvPicPr>
           <p:blipFill>
-            <a:blip r:embed="rId4">
+            <a:blip r:embed="rId3">
               <a:extLst>
                 <a:ext uri="{28A0092B-C50C-407E-A947-70E740481C1C}">
                   <a14:useLocalDpi xmlns:a14="http://schemas.microsoft.com/office/drawing/2010/main" val="0"/>
@@ -9069,7 +8956,7 @@
             <p:cNvPr id="27" name="ZoneTexte 26">
               <a:extLst>
                 <a:ext uri="{FF2B5EF4-FFF2-40B4-BE49-F238E27FC236}">
-                  <a16:creationId xmlns:a16="http://schemas.microsoft.com/office/drawing/2014/main" id="{9D89F87D-92E6-A90D-EDA8-9989ED91E3DD}"/>
+                  <a16:creationId xmlns:a16="http://schemas.microsoft.com/office/drawing/2014/main" id="{7556433F-6B36-A6AA-BA3C-9591047E4987}"/>
                 </a:ext>
               </a:extLst>
             </p:cNvPr>
@@ -9113,7 +9000,7 @@
           <p:cNvPr id="39" name="Accolade fermante 38">
             <a:extLst>
               <a:ext uri="{FF2B5EF4-FFF2-40B4-BE49-F238E27FC236}">
-                <a16:creationId xmlns:a16="http://schemas.microsoft.com/office/drawing/2014/main" id="{7D67046C-4820-8BDA-CFF8-5D8146441E60}"/>
+                <a16:creationId xmlns:a16="http://schemas.microsoft.com/office/drawing/2014/main" id="{CCAB7595-CCF7-2C69-2D4A-41A76560A7B6}"/>
               </a:ext>
             </a:extLst>
           </p:cNvPr>
@@ -9122,7 +9009,7 @@
         </p:nvSpPr>
         <p:spPr>
           <a:xfrm>
-            <a:off x="1301811" y="1474608"/>
+            <a:off x="1301811" y="1441950"/>
             <a:ext cx="402590" cy="3691751"/>
           </a:xfrm>
           <a:prstGeom prst="rightBrace">
@@ -9160,7 +9047,7 @@
           <p:cNvPr id="40" name="Rectangle : coins arrondis 39">
             <a:extLst>
               <a:ext uri="{FF2B5EF4-FFF2-40B4-BE49-F238E27FC236}">
-                <a16:creationId xmlns:a16="http://schemas.microsoft.com/office/drawing/2014/main" id="{E466E66B-AB7E-A008-E8B7-28EFFC507FA2}"/>
+                <a16:creationId xmlns:a16="http://schemas.microsoft.com/office/drawing/2014/main" id="{3A084DAD-93E3-A6FA-3904-243D461079E5}"/>
               </a:ext>
             </a:extLst>
           </p:cNvPr>
@@ -9169,7 +9056,7 @@
         </p:nvSpPr>
         <p:spPr>
           <a:xfrm>
-            <a:off x="1868835" y="1189237"/>
+            <a:off x="1868835" y="1211009"/>
             <a:ext cx="2463806" cy="1851152"/>
           </a:xfrm>
           <a:prstGeom prst="roundRect">
@@ -9240,7 +9127,7 @@
           <p:cNvPr id="42" name="ZoneTexte 41">
             <a:extLst>
               <a:ext uri="{FF2B5EF4-FFF2-40B4-BE49-F238E27FC236}">
-                <a16:creationId xmlns:a16="http://schemas.microsoft.com/office/drawing/2014/main" id="{2D6FC20A-F3C0-3322-2817-2541D8BB0AA2}"/>
+                <a16:creationId xmlns:a16="http://schemas.microsoft.com/office/drawing/2014/main" id="{25BFC179-209C-1784-3E1B-9C93A25A8A06}"/>
               </a:ext>
             </a:extLst>
           </p:cNvPr>
@@ -9249,7 +9136,7 @@
         </p:nvSpPr>
         <p:spPr>
           <a:xfrm>
-            <a:off x="9246646" y="800482"/>
+            <a:off x="9246646" y="822254"/>
             <a:ext cx="947695" cy="369332"/>
           </a:xfrm>
           <a:prstGeom prst="rect">
@@ -9282,7 +9169,7 @@
           <p:cNvPr id="4" name="Rectangle : coins arrondis 3">
             <a:extLst>
               <a:ext uri="{FF2B5EF4-FFF2-40B4-BE49-F238E27FC236}">
-                <a16:creationId xmlns:a16="http://schemas.microsoft.com/office/drawing/2014/main" id="{C9666411-9498-2649-7731-55F4F82B7515}"/>
+                <a16:creationId xmlns:a16="http://schemas.microsoft.com/office/drawing/2014/main" id="{468E8B8A-3628-841C-F591-5748841F8DC3}"/>
               </a:ext>
             </a:extLst>
           </p:cNvPr>
@@ -9291,7 +9178,7 @@
         </p:nvSpPr>
         <p:spPr>
           <a:xfrm>
-            <a:off x="4626429" y="1189236"/>
+            <a:off x="4626429" y="1211008"/>
             <a:ext cx="3308366" cy="1851152"/>
           </a:xfrm>
           <a:prstGeom prst="roundRect">
@@ -9356,7 +9243,7 @@
           <p:cNvPr id="5" name="ZoneTexte 4">
             <a:extLst>
               <a:ext uri="{FF2B5EF4-FFF2-40B4-BE49-F238E27FC236}">
-                <a16:creationId xmlns:a16="http://schemas.microsoft.com/office/drawing/2014/main" id="{E38039D7-7788-E8CF-0B9F-9C2932E6F0F0}"/>
+                <a16:creationId xmlns:a16="http://schemas.microsoft.com/office/drawing/2014/main" id="{04F7056E-3668-C086-F74C-0F44EF76E1EF}"/>
               </a:ext>
             </a:extLst>
           </p:cNvPr>
@@ -9365,7 +9252,7 @@
         </p:nvSpPr>
         <p:spPr>
           <a:xfrm>
-            <a:off x="5806764" y="800482"/>
+            <a:off x="5806764" y="822254"/>
             <a:ext cx="947695" cy="369332"/>
           </a:xfrm>
           <a:prstGeom prst="rect">
@@ -9398,7 +9285,7 @@
           <p:cNvPr id="2" name="Connecteur droit avec flèche 1">
             <a:extLst>
               <a:ext uri="{FF2B5EF4-FFF2-40B4-BE49-F238E27FC236}">
-                <a16:creationId xmlns:a16="http://schemas.microsoft.com/office/drawing/2014/main" id="{A3742504-3954-CD44-01F9-EE299490615D}"/>
+                <a16:creationId xmlns:a16="http://schemas.microsoft.com/office/drawing/2014/main" id="{B61520E2-C6EE-74FB-F4CA-B4070EB6C115}"/>
               </a:ext>
             </a:extLst>
           </p:cNvPr>
@@ -9411,7 +9298,7 @@
         </p:nvCxnSpPr>
         <p:spPr>
           <a:xfrm flipV="1">
-            <a:off x="4332641" y="2114812"/>
+            <a:off x="4332641" y="2136584"/>
             <a:ext cx="293788" cy="1"/>
           </a:xfrm>
           <a:prstGeom prst="straightConnector1">
@@ -9441,7 +9328,7 @@
           <p:cNvPr id="28" name="Rectangle : coins arrondis 27">
             <a:extLst>
               <a:ext uri="{FF2B5EF4-FFF2-40B4-BE49-F238E27FC236}">
-                <a16:creationId xmlns:a16="http://schemas.microsoft.com/office/drawing/2014/main" id="{08E47B86-6B9B-41F6-24A1-196C67E3CF2F}"/>
+                <a16:creationId xmlns:a16="http://schemas.microsoft.com/office/drawing/2014/main" id="{F8101A3E-6218-E654-ADD1-F29B217111CE}"/>
               </a:ext>
             </a:extLst>
           </p:cNvPr>
@@ -9450,7 +9337,7 @@
         </p:nvSpPr>
         <p:spPr>
           <a:xfrm>
-            <a:off x="8228583" y="1189237"/>
+            <a:off x="8228583" y="1211009"/>
             <a:ext cx="2983823" cy="1851152"/>
           </a:xfrm>
           <a:prstGeom prst="roundRect">
@@ -9515,7 +9402,7 @@
           <p:cNvPr id="56" name="ZoneTexte 55">
             <a:extLst>
               <a:ext uri="{FF2B5EF4-FFF2-40B4-BE49-F238E27FC236}">
-                <a16:creationId xmlns:a16="http://schemas.microsoft.com/office/drawing/2014/main" id="{39E2B6A7-A9E5-C6D5-C730-305E3A5A3AB7}"/>
+                <a16:creationId xmlns:a16="http://schemas.microsoft.com/office/drawing/2014/main" id="{C42C3295-2EE2-9C81-A39A-0C85C97ACE4C}"/>
               </a:ext>
             </a:extLst>
           </p:cNvPr>
@@ -9524,7 +9411,7 @@
         </p:nvSpPr>
         <p:spPr>
           <a:xfrm>
-            <a:off x="2626890" y="800482"/>
+            <a:off x="2626890" y="822254"/>
             <a:ext cx="947695" cy="369332"/>
           </a:xfrm>
           <a:prstGeom prst="rect">
@@ -9557,7 +9444,7 @@
           <p:cNvPr id="62" name="Connecteur droit avec flèche 61">
             <a:extLst>
               <a:ext uri="{FF2B5EF4-FFF2-40B4-BE49-F238E27FC236}">
-                <a16:creationId xmlns:a16="http://schemas.microsoft.com/office/drawing/2014/main" id="{990BD7AA-81DE-DA5D-4677-30ABFA0C84FD}"/>
+                <a16:creationId xmlns:a16="http://schemas.microsoft.com/office/drawing/2014/main" id="{B9443258-0AFF-6ED0-F1A4-F9BC18C2ED4B}"/>
               </a:ext>
             </a:extLst>
           </p:cNvPr>
@@ -9570,7 +9457,7 @@
         </p:nvCxnSpPr>
         <p:spPr>
           <a:xfrm>
-            <a:off x="7934795" y="2114812"/>
+            <a:off x="7934795" y="2136584"/>
             <a:ext cx="293788" cy="1"/>
           </a:xfrm>
           <a:prstGeom prst="straightConnector1">
@@ -9595,12 +9482,99 @@
           </a:fontRef>
         </p:style>
       </p:cxnSp>
-      <p:sp>
-        <p:nvSpPr>
-          <p:cNvPr id="3" name="Rectangle : coins arrondis 2">
-            <a:extLst>
-              <a:ext uri="{FF2B5EF4-FFF2-40B4-BE49-F238E27FC236}">
-                <a16:creationId xmlns:a16="http://schemas.microsoft.com/office/drawing/2014/main" id="{A65E593C-14B8-FD36-2A18-221B30F18365}"/>
+      <p:cxnSp>
+        <p:nvCxnSpPr>
+          <p:cNvPr id="6" name="Connecteur en angle 5">
+            <a:extLst>
+              <a:ext uri="{FF2B5EF4-FFF2-40B4-BE49-F238E27FC236}">
+                <a16:creationId xmlns:a16="http://schemas.microsoft.com/office/drawing/2014/main" id="{0093AC16-49D3-15CB-A18A-CC6114F5403D}"/>
+              </a:ext>
+            </a:extLst>
+          </p:cNvPr>
+          <p:cNvCxnSpPr>
+            <a:cxnSpLocks/>
+            <a:stCxn id="28" idx="2"/>
+            <a:endCxn id="10" idx="0"/>
+          </p:cNvCxnSpPr>
+          <p:nvPr/>
+        </p:nvCxnSpPr>
+        <p:spPr>
+          <a:xfrm rot="5400000">
+            <a:off x="6294865" y="23615"/>
+            <a:ext cx="387085" cy="6464176"/>
+          </a:xfrm>
+          <a:prstGeom prst="bentConnector3">
+            <a:avLst>
+              <a:gd name="adj1" fmla="val 50000"/>
+            </a:avLst>
+          </a:prstGeom>
+          <a:ln w="19050">
+            <a:tailEnd type="triangle" w="lg" len="lg"/>
+          </a:ln>
+        </p:spPr>
+        <p:style>
+          <a:lnRef idx="1">
+            <a:schemeClr val="dk1"/>
+          </a:lnRef>
+          <a:fillRef idx="0">
+            <a:schemeClr val="dk1"/>
+          </a:fillRef>
+          <a:effectRef idx="0">
+            <a:schemeClr val="dk1"/>
+          </a:effectRef>
+          <a:fontRef idx="minor">
+            <a:schemeClr val="tx1"/>
+          </a:fontRef>
+        </p:style>
+      </p:cxnSp>
+      <p:sp>
+        <p:nvSpPr>
+          <p:cNvPr id="9" name="ZoneTexte 8">
+            <a:extLst>
+              <a:ext uri="{FF2B5EF4-FFF2-40B4-BE49-F238E27FC236}">
+                <a16:creationId xmlns:a16="http://schemas.microsoft.com/office/drawing/2014/main" id="{01F729FB-E23D-1ECB-1541-84E13187EA66}"/>
+              </a:ext>
+            </a:extLst>
+          </p:cNvPr>
+          <p:cNvSpPr txBox="1"/>
+          <p:nvPr/>
+        </p:nvSpPr>
+        <p:spPr>
+          <a:xfrm>
+            <a:off x="2782470" y="5865941"/>
+            <a:ext cx="947695" cy="369332"/>
+          </a:xfrm>
+          <a:prstGeom prst="rect">
+            <a:avLst/>
+          </a:prstGeom>
+          <a:noFill/>
+        </p:spPr>
+        <p:txBody>
+          <a:bodyPr wrap="none" rtlCol="0">
+            <a:spAutoFit/>
+          </a:bodyPr>
+          <a:lstStyle/>
+          <a:p>
+            <a:pPr algn="ctr"/>
+            <a:r>
+              <a:rPr lang="fr-FR" b="1">
+                <a:solidFill>
+                  <a:schemeClr val="accent1"/>
+                </a:solidFill>
+                <a:latin typeface="Avenir Black" panose="02000503020000020003" pitchFamily="2" charset="0"/>
+                <a:cs typeface="Beirut" pitchFamily="2" charset="-78"/>
+              </a:rPr>
+              <a:t>STEP 4</a:t>
+            </a:r>
+          </a:p>
+        </p:txBody>
+      </p:sp>
+      <p:sp>
+        <p:nvSpPr>
+          <p:cNvPr id="7" name="Rectangle : coins arrondis 6">
+            <a:extLst>
+              <a:ext uri="{FF2B5EF4-FFF2-40B4-BE49-F238E27FC236}">
+                <a16:creationId xmlns:a16="http://schemas.microsoft.com/office/drawing/2014/main" id="{B6E1A90C-58C7-D38E-86DC-8B2705BF118F}"/>
               </a:ext>
             </a:extLst>
           </p:cNvPr>
@@ -9609,8 +9583,191 @@
         </p:nvSpPr>
         <p:spPr>
           <a:xfrm>
-            <a:off x="1868835" y="3598859"/>
-            <a:ext cx="2774967" cy="2162841"/>
+            <a:off x="4976309" y="3449246"/>
+            <a:ext cx="2774967" cy="2388655"/>
+          </a:xfrm>
+          <a:prstGeom prst="roundRect">
+            <a:avLst>
+              <a:gd name="adj" fmla="val 6902"/>
+            </a:avLst>
+          </a:prstGeom>
+          <a:ln/>
+          <a:effectLst>
+            <a:outerShdw blurRad="50800" dist="38100" dir="2700000" algn="tl" rotWithShape="0">
+              <a:prstClr val="black">
+                <a:alpha val="40000"/>
+              </a:prstClr>
+            </a:outerShdw>
+          </a:effectLst>
+        </p:spPr>
+        <p:style>
+          <a:lnRef idx="2">
+            <a:schemeClr val="dk1"/>
+          </a:lnRef>
+          <a:fillRef idx="1">
+            <a:schemeClr val="lt1"/>
+          </a:fillRef>
+          <a:effectRef idx="0">
+            <a:schemeClr val="dk1"/>
+          </a:effectRef>
+          <a:fontRef idx="minor">
+            <a:schemeClr val="dk1"/>
+          </a:fontRef>
+        </p:style>
+        <p:txBody>
+          <a:bodyPr rtlCol="0" anchor="ctr"/>
+          <a:lstStyle/>
+          <a:p>
+            <a:r>
+              <a:rPr lang="fr-FR" sz="2000" b="1"/>
+              <a:t>Build the CGM</a:t>
+            </a:r>
+          </a:p>
+          <a:p>
+            <a:r>
+              <a:rPr lang="fr-FR"/>
+              <a:t>• Check mass balance</a:t>
+            </a:r>
+          </a:p>
+          <a:p>
+            <a:r>
+              <a:rPr lang="fr-FR"/>
+              <a:t>• Convert units</a:t>
+            </a:r>
+          </a:p>
+          <a:p>
+            <a:r>
+              <a:rPr lang="fr-FR"/>
+              <a:t>• Ribosomal reaction</a:t>
+            </a:r>
+          </a:p>
+          <a:p>
+            <a:r>
+              <a:rPr lang="fr-FR"/>
+              <a:t>• Housekeeping proteins</a:t>
+            </a:r>
+          </a:p>
+          <a:p>
+            <a:r>
+              <a:rPr lang="fr-FR"/>
+              <a:t>• Activation/inactivation</a:t>
+            </a:r>
+          </a:p>
+          <a:p>
+            <a:r>
+              <a:rPr lang="fr-FR"/>
+              <a:t>• External conditions</a:t>
+            </a:r>
+          </a:p>
+          <a:p>
+            <a:r>
+              <a:rPr lang="fr-FR"/>
+              <a:t>• Find an initial solution</a:t>
+            </a:r>
+          </a:p>
+        </p:txBody>
+      </p:sp>
+      <p:cxnSp>
+        <p:nvCxnSpPr>
+          <p:cNvPr id="8" name="Connecteur droit avec flèche 7">
+            <a:extLst>
+              <a:ext uri="{FF2B5EF4-FFF2-40B4-BE49-F238E27FC236}">
+                <a16:creationId xmlns:a16="http://schemas.microsoft.com/office/drawing/2014/main" id="{EE0BE8C5-1736-368B-5470-BC9AEB0056F6}"/>
+              </a:ext>
+            </a:extLst>
+          </p:cNvPr>
+          <p:cNvCxnSpPr>
+            <a:cxnSpLocks/>
+            <a:stCxn id="10" idx="3"/>
+            <a:endCxn id="7" idx="1"/>
+          </p:cNvCxnSpPr>
+          <p:nvPr/>
+        </p:nvCxnSpPr>
+        <p:spPr>
+          <a:xfrm>
+            <a:off x="4643802" y="4643574"/>
+            <a:ext cx="332507" cy="0"/>
+          </a:xfrm>
+          <a:prstGeom prst="straightConnector1">
+            <a:avLst/>
+          </a:prstGeom>
+          <a:ln>
+            <a:tailEnd type="triangle" w="lg" len="lg"/>
+          </a:ln>
+        </p:spPr>
+        <p:style>
+          <a:lnRef idx="2">
+            <a:schemeClr val="dk1"/>
+          </a:lnRef>
+          <a:fillRef idx="0">
+            <a:schemeClr val="dk1"/>
+          </a:fillRef>
+          <a:effectRef idx="1">
+            <a:schemeClr val="dk1"/>
+          </a:effectRef>
+          <a:fontRef idx="minor">
+            <a:schemeClr val="tx1"/>
+          </a:fontRef>
+        </p:style>
+      </p:cxnSp>
+      <p:sp>
+        <p:nvSpPr>
+          <p:cNvPr id="17" name="ZoneTexte 16">
+            <a:extLst>
+              <a:ext uri="{FF2B5EF4-FFF2-40B4-BE49-F238E27FC236}">
+                <a16:creationId xmlns:a16="http://schemas.microsoft.com/office/drawing/2014/main" id="{25B2B035-D5E8-FEE1-F478-49766499D55B}"/>
+              </a:ext>
+            </a:extLst>
+          </p:cNvPr>
+          <p:cNvSpPr txBox="1"/>
+          <p:nvPr/>
+        </p:nvSpPr>
+        <p:spPr>
+          <a:xfrm>
+            <a:off x="5806764" y="5865941"/>
+            <a:ext cx="947695" cy="369332"/>
+          </a:xfrm>
+          <a:prstGeom prst="rect">
+            <a:avLst/>
+          </a:prstGeom>
+          <a:noFill/>
+        </p:spPr>
+        <p:txBody>
+          <a:bodyPr wrap="none" rtlCol="0">
+            <a:spAutoFit/>
+          </a:bodyPr>
+          <a:lstStyle/>
+          <a:p>
+            <a:pPr algn="ctr"/>
+            <a:r>
+              <a:rPr lang="fr-FR" b="1">
+                <a:solidFill>
+                  <a:schemeClr val="accent1"/>
+                </a:solidFill>
+                <a:latin typeface="Avenir Black" panose="02000503020000020003" pitchFamily="2" charset="0"/>
+                <a:cs typeface="Beirut" pitchFamily="2" charset="-78"/>
+              </a:rPr>
+              <a:t>STEP 5</a:t>
+            </a:r>
+          </a:p>
+        </p:txBody>
+      </p:sp>
+      <p:sp>
+        <p:nvSpPr>
+          <p:cNvPr id="10" name="Rectangle : coins arrondis 9">
+            <a:extLst>
+              <a:ext uri="{FF2B5EF4-FFF2-40B4-BE49-F238E27FC236}">
+                <a16:creationId xmlns:a16="http://schemas.microsoft.com/office/drawing/2014/main" id="{22C6B934-E412-3342-27BD-7D5D4EAA27E2}"/>
+              </a:ext>
+            </a:extLst>
+          </p:cNvPr>
+          <p:cNvSpPr/>
+          <p:nvPr/>
+        </p:nvSpPr>
+        <p:spPr>
+          <a:xfrm>
+            <a:off x="1868835" y="3449246"/>
+            <a:ext cx="2774967" cy="2388655"/>
           </a:xfrm>
           <a:prstGeom prst="roundRect">
             <a:avLst>
@@ -9646,192 +9803,7 @@
           <a:p>
             <a:r>
               <a:rPr lang="fr-FR" sz="2000" b="1"/>
-              <a:t>Build the CGM</a:t>
-            </a:r>
-          </a:p>
-          <a:p>
-            <a:r>
-              <a:rPr lang="fr-FR"/>
-              <a:t>• Check mass balance</a:t>
-            </a:r>
-          </a:p>
-          <a:p>
-            <a:r>
-              <a:rPr lang="fr-FR"/>
-              <a:t>• Ribosomal reaction</a:t>
-            </a:r>
-          </a:p>
-          <a:p>
-            <a:r>
-              <a:rPr lang="fr-FR"/>
-              <a:t>• Activation/inactivation</a:t>
-            </a:r>
-          </a:p>
-          <a:p>
-            <a:r>
-              <a:rPr lang="fr-FR"/>
-              <a:t>• External conditions</a:t>
-            </a:r>
-          </a:p>
-          <a:p>
-            <a:r>
-              <a:rPr lang="fr-FR"/>
-              <a:t>• Constant reactions</a:t>
-            </a:r>
-          </a:p>
-          <a:p>
-            <a:r>
-              <a:rPr lang="fr-FR"/>
-              <a:t>• Find initial solution</a:t>
-            </a:r>
-          </a:p>
-        </p:txBody>
-      </p:sp>
-      <p:cxnSp>
-        <p:nvCxnSpPr>
-          <p:cNvPr id="6" name="Connecteur en angle 5">
-            <a:extLst>
-              <a:ext uri="{FF2B5EF4-FFF2-40B4-BE49-F238E27FC236}">
-                <a16:creationId xmlns:a16="http://schemas.microsoft.com/office/drawing/2014/main" id="{6FEF7732-FA5C-3B74-8AF2-4773BC8A0D5B}"/>
-              </a:ext>
-            </a:extLst>
-          </p:cNvPr>
-          <p:cNvCxnSpPr>
-            <a:cxnSpLocks/>
-            <a:stCxn id="28" idx="2"/>
-            <a:endCxn id="3" idx="0"/>
-          </p:cNvCxnSpPr>
-          <p:nvPr/>
-        </p:nvCxnSpPr>
-        <p:spPr>
-          <a:xfrm rot="5400000">
-            <a:off x="6209172" y="87536"/>
-            <a:ext cx="558470" cy="6464176"/>
-          </a:xfrm>
-          <a:prstGeom prst="bentConnector3">
-            <a:avLst>
-              <a:gd name="adj1" fmla="val 50000"/>
-            </a:avLst>
-          </a:prstGeom>
-          <a:ln w="19050">
-            <a:tailEnd type="triangle" w="lg" len="lg"/>
-          </a:ln>
-        </p:spPr>
-        <p:style>
-          <a:lnRef idx="1">
-            <a:schemeClr val="dk1"/>
-          </a:lnRef>
-          <a:fillRef idx="0">
-            <a:schemeClr val="dk1"/>
-          </a:fillRef>
-          <a:effectRef idx="0">
-            <a:schemeClr val="dk1"/>
-          </a:effectRef>
-          <a:fontRef idx="minor">
-            <a:schemeClr val="tx1"/>
-          </a:fontRef>
-        </p:style>
-      </p:cxnSp>
-      <p:sp>
-        <p:nvSpPr>
-          <p:cNvPr id="9" name="ZoneTexte 8">
-            <a:extLst>
-              <a:ext uri="{FF2B5EF4-FFF2-40B4-BE49-F238E27FC236}">
-                <a16:creationId xmlns:a16="http://schemas.microsoft.com/office/drawing/2014/main" id="{01F654C9-A8CE-F7BD-DF49-A40E020A7FDC}"/>
-              </a:ext>
-            </a:extLst>
-          </p:cNvPr>
-          <p:cNvSpPr txBox="1"/>
-          <p:nvPr/>
-        </p:nvSpPr>
-        <p:spPr>
-          <a:xfrm>
-            <a:off x="2782470" y="5789740"/>
-            <a:ext cx="947695" cy="369332"/>
-          </a:xfrm>
-          <a:prstGeom prst="rect">
-            <a:avLst/>
-          </a:prstGeom>
-          <a:noFill/>
-        </p:spPr>
-        <p:txBody>
-          <a:bodyPr wrap="none" rtlCol="0">
-            <a:spAutoFit/>
-          </a:bodyPr>
-          <a:lstStyle/>
-          <a:p>
-            <a:pPr algn="ctr"/>
-            <a:r>
-              <a:rPr lang="fr-FR" b="1">
-                <a:solidFill>
-                  <a:schemeClr val="accent1"/>
-                </a:solidFill>
-                <a:latin typeface="Avenir Black" panose="02000503020000020003" pitchFamily="2" charset="0"/>
-                <a:cs typeface="Beirut" pitchFamily="2" charset="-78"/>
-              </a:rPr>
-              <a:t>STEP 4</a:t>
-            </a:r>
-          </a:p>
-        </p:txBody>
-      </p:sp>
-      <p:sp>
-        <p:nvSpPr>
-          <p:cNvPr id="7" name="Rectangle : coins arrondis 6">
-            <a:extLst>
-              <a:ext uri="{FF2B5EF4-FFF2-40B4-BE49-F238E27FC236}">
-                <a16:creationId xmlns:a16="http://schemas.microsoft.com/office/drawing/2014/main" id="{4258314C-F8CC-D038-4135-118C2B3FE402}"/>
-              </a:ext>
-            </a:extLst>
-          </p:cNvPr>
-          <p:cNvSpPr/>
-          <p:nvPr/>
-        </p:nvSpPr>
-        <p:spPr>
-          <a:xfrm>
-            <a:off x="4976309" y="3598859"/>
-            <a:ext cx="2774967" cy="2162841"/>
-          </a:xfrm>
-          <a:prstGeom prst="roundRect">
-            <a:avLst>
-              <a:gd name="adj" fmla="val 8412"/>
-            </a:avLst>
-          </a:prstGeom>
-          <a:ln/>
-          <a:effectLst>
-            <a:outerShdw blurRad="50800" dist="38100" dir="2700000" algn="tl" rotWithShape="0">
-              <a:prstClr val="black">
-                <a:alpha val="40000"/>
-              </a:prstClr>
-            </a:outerShdw>
-          </a:effectLst>
-        </p:spPr>
-        <p:style>
-          <a:lnRef idx="2">
-            <a:schemeClr val="dk1"/>
-          </a:lnRef>
-          <a:fillRef idx="1">
-            <a:schemeClr val="lt1"/>
-          </a:fillRef>
-          <a:effectRef idx="0">
-            <a:schemeClr val="dk1"/>
-          </a:effectRef>
-          <a:fontRef idx="minor">
-            <a:schemeClr val="dk1"/>
-          </a:fontRef>
-        </p:style>
-        <p:txBody>
-          <a:bodyPr rtlCol="0" anchor="ctr"/>
-          <a:lstStyle/>
-          <a:p>
-            <a:r>
-              <a:rPr lang="fr-FR" sz="2000" b="1"/>
-              <a:t>Optional:</a:t>
-            </a:r>
-          </a:p>
-          <a:p>
-            <a:r>
-              <a:rPr lang="fr-FR" sz="2000" b="1"/>
-              <a:t>Reduce to full-column rank problem</a:t>
+              <a:t>Reduce the model to a convex problem</a:t>
             </a:r>
           </a:p>
           <a:p>
@@ -9846,105 +9818,14 @@
               <a:t>• Reduce the CGM</a:t>
             </a:r>
           </a:p>
-          <a:p>
-            <a:r>
-              <a:rPr lang="fr-FR"/>
-              <a:t>• Find initial solution</a:t>
-            </a:r>
-          </a:p>
-        </p:txBody>
-      </p:sp>
-      <p:cxnSp>
-        <p:nvCxnSpPr>
-          <p:cNvPr id="8" name="Connecteur droit avec flèche 7">
-            <a:extLst>
-              <a:ext uri="{FF2B5EF4-FFF2-40B4-BE49-F238E27FC236}">
-                <a16:creationId xmlns:a16="http://schemas.microsoft.com/office/drawing/2014/main" id="{862D18AD-36C5-1FA3-1A80-5372612657CE}"/>
-              </a:ext>
-            </a:extLst>
-          </p:cNvPr>
-          <p:cNvCxnSpPr>
-            <a:cxnSpLocks/>
-            <a:stCxn id="3" idx="3"/>
-            <a:endCxn id="7" idx="1"/>
-          </p:cNvCxnSpPr>
-          <p:nvPr/>
-        </p:nvCxnSpPr>
-        <p:spPr>
-          <a:xfrm>
-            <a:off x="4643802" y="4680280"/>
-            <a:ext cx="332507" cy="0"/>
-          </a:xfrm>
-          <a:prstGeom prst="straightConnector1">
-            <a:avLst/>
-          </a:prstGeom>
-          <a:ln>
-            <a:tailEnd type="triangle" w="lg" len="lg"/>
-          </a:ln>
-        </p:spPr>
-        <p:style>
-          <a:lnRef idx="2">
-            <a:schemeClr val="dk1"/>
-          </a:lnRef>
-          <a:fillRef idx="0">
-            <a:schemeClr val="dk1"/>
-          </a:fillRef>
-          <a:effectRef idx="1">
-            <a:schemeClr val="dk1"/>
-          </a:effectRef>
-          <a:fontRef idx="minor">
-            <a:schemeClr val="tx1"/>
-          </a:fontRef>
-        </p:style>
-      </p:cxnSp>
-      <p:sp>
-        <p:nvSpPr>
-          <p:cNvPr id="17" name="ZoneTexte 16">
-            <a:extLst>
-              <a:ext uri="{FF2B5EF4-FFF2-40B4-BE49-F238E27FC236}">
-                <a16:creationId xmlns:a16="http://schemas.microsoft.com/office/drawing/2014/main" id="{B2D605A1-07FD-67F9-8EF0-237ADF8A51D1}"/>
-              </a:ext>
-            </a:extLst>
-          </p:cNvPr>
-          <p:cNvSpPr txBox="1"/>
-          <p:nvPr/>
-        </p:nvSpPr>
-        <p:spPr>
-          <a:xfrm>
-            <a:off x="5806764" y="5789740"/>
-            <a:ext cx="947695" cy="369332"/>
-          </a:xfrm>
-          <a:prstGeom prst="rect">
-            <a:avLst/>
-          </a:prstGeom>
-          <a:noFill/>
-        </p:spPr>
-        <p:txBody>
-          <a:bodyPr wrap="none" rtlCol="0">
-            <a:spAutoFit/>
-          </a:bodyPr>
-          <a:lstStyle/>
-          <a:p>
-            <a:pPr algn="ctr"/>
-            <a:r>
-              <a:rPr lang="fr-FR" b="1">
-                <a:solidFill>
-                  <a:schemeClr val="accent1"/>
-                </a:solidFill>
-                <a:latin typeface="Avenir Black" panose="02000503020000020003" pitchFamily="2" charset="0"/>
-                <a:cs typeface="Beirut" pitchFamily="2" charset="-78"/>
-              </a:rPr>
-              <a:t>STEP 5</a:t>
-            </a:r>
-          </a:p>
-        </p:txBody>
-      </p:sp>
-      <p:sp>
-        <p:nvSpPr>
-          <p:cNvPr id="10" name="Rectangle : coins arrondis 9">
-            <a:extLst>
-              <a:ext uri="{FF2B5EF4-FFF2-40B4-BE49-F238E27FC236}">
-                <a16:creationId xmlns:a16="http://schemas.microsoft.com/office/drawing/2014/main" id="{0FE49D60-01F4-3303-3A17-2159AD47E3EC}"/>
+        </p:txBody>
+      </p:sp>
+      <p:sp>
+        <p:nvSpPr>
+          <p:cNvPr id="3" name="Rectangle : coins arrondis 2">
+            <a:extLst>
+              <a:ext uri="{FF2B5EF4-FFF2-40B4-BE49-F238E27FC236}">
+                <a16:creationId xmlns:a16="http://schemas.microsoft.com/office/drawing/2014/main" id="{A21FD292-8EAA-915E-784D-832F7E2E10FF}"/>
               </a:ext>
             </a:extLst>
           </p:cNvPr>
@@ -10009,10 +9890,10 @@
       </p:sp>
       <p:sp>
         <p:nvSpPr>
-          <p:cNvPr id="12" name="Accolade fermante 11">
-            <a:extLst>
-              <a:ext uri="{FF2B5EF4-FFF2-40B4-BE49-F238E27FC236}">
-                <a16:creationId xmlns:a16="http://schemas.microsoft.com/office/drawing/2014/main" id="{B779B493-22B8-8D91-6B85-8F9CA49DB71C}"/>
+          <p:cNvPr id="11" name="Accolade fermante 10">
+            <a:extLst>
+              <a:ext uri="{FF2B5EF4-FFF2-40B4-BE49-F238E27FC236}">
+                <a16:creationId xmlns:a16="http://schemas.microsoft.com/office/drawing/2014/main" id="{61B4BC81-3F1D-5051-2486-30B504941899}"/>
               </a:ext>
             </a:extLst>
           </p:cNvPr>
@@ -10056,10 +9937,10 @@
       </p:sp>
       <p:pic>
         <p:nvPicPr>
-          <p:cNvPr id="1026" name="Picture 2" descr="Free Vectors | Structure of cells">
-            <a:extLst>
-              <a:ext uri="{FF2B5EF4-FFF2-40B4-BE49-F238E27FC236}">
-                <a16:creationId xmlns:a16="http://schemas.microsoft.com/office/drawing/2014/main" id="{E829AF87-8DE7-5189-B6B1-4C924CE0778A}"/>
+          <p:cNvPr id="12" name="Picture 2" descr="Free Vectors | Structure of cells">
+            <a:extLst>
+              <a:ext uri="{FF2B5EF4-FFF2-40B4-BE49-F238E27FC236}">
+                <a16:creationId xmlns:a16="http://schemas.microsoft.com/office/drawing/2014/main" id="{07580849-407E-445A-B61F-66A2AD97683E}"/>
               </a:ext>
             </a:extLst>
           </p:cNvPr>
@@ -10069,7 +9950,7 @@
           <p:nvPr/>
         </p:nvPicPr>
         <p:blipFill rotWithShape="1">
-          <a:blip r:embed="rId5">
+          <a:blip r:embed="rId4">
             <a:duotone>
               <a:schemeClr val="accent1">
                 <a:shade val="45000"/>
@@ -10080,7 +9961,7 @@
             <a:extLst>
               <a:ext uri="{BEBA8EAE-BF5A-486C-A8C5-ECC9F3942E4B}">
                 <a14:imgProps xmlns:a14="http://schemas.microsoft.com/office/drawing/2010/main">
-                  <a14:imgLayer r:embed="rId6">
+                  <a14:imgLayer r:embed="rId5">
                     <a14:imgEffect>
                       <a14:colorTemperature colorTemp="5300"/>
                     </a14:imgEffect>
@@ -10118,7 +9999,7 @@
     </p:spTree>
     <p:extLst>
       <p:ext uri="{BB962C8B-B14F-4D97-AF65-F5344CB8AC3E}">
-        <p14:creationId xmlns:p14="http://schemas.microsoft.com/office/powerpoint/2010/main" val="2346635558"/>
+        <p14:creationId xmlns:p14="http://schemas.microsoft.com/office/powerpoint/2010/main" val="1286655770"/>
       </p:ext>
     </p:extLst>
   </p:cSld>
@@ -10173,7 +10054,7 @@
         </p:blipFill>
         <p:spPr>
           <a:xfrm>
-            <a:off x="6723051" y="5307619"/>
+            <a:off x="6810139" y="5362049"/>
             <a:ext cx="604279" cy="720865"/>
           </a:xfrm>
           <a:prstGeom prst="rect">
@@ -11065,8 +10946,8 @@
         </p:nvSpPr>
         <p:spPr>
           <a:xfrm>
-            <a:off x="1868835" y="3598859"/>
-            <a:ext cx="1425160" cy="1851152"/>
+            <a:off x="1868834" y="3598859"/>
+            <a:ext cx="2776805" cy="1851152"/>
           </a:xfrm>
           <a:prstGeom prst="roundRect">
             <a:avLst>
@@ -11103,7 +10984,7 @@
             <a:pPr algn="ctr"/>
             <a:r>
               <a:rPr lang="fr-FR" sz="2000" b="1"/>
-              <a:t>Build the CGM</a:t>
+              <a:t>Reduce the model to a convex problem</a:t>
             </a:r>
           </a:p>
         </p:txBody>
@@ -11126,8 +11007,8 @@
         </p:nvCxnSpPr>
         <p:spPr>
           <a:xfrm rot="5400000">
-            <a:off x="4322199" y="1299605"/>
-            <a:ext cx="558470" cy="4040038"/>
+            <a:off x="4660110" y="1637516"/>
+            <a:ext cx="558470" cy="3364216"/>
           </a:xfrm>
           <a:prstGeom prst="bentConnector3">
             <a:avLst>
@@ -11168,7 +11049,7 @@
         <p:spPr>
           <a:xfrm>
             <a:off x="1868835" y="5485920"/>
-            <a:ext cx="1425159" cy="369332"/>
+            <a:ext cx="2776804" cy="369332"/>
           </a:xfrm>
           <a:prstGeom prst="rect">
             <a:avLst/>
@@ -11209,8 +11090,8 @@
         </p:nvSpPr>
         <p:spPr>
           <a:xfrm>
-            <a:off x="3665511" y="3598859"/>
-            <a:ext cx="3107515" cy="1850605"/>
+            <a:off x="4923244" y="3598859"/>
+            <a:ext cx="1849782" cy="1850605"/>
           </a:xfrm>
           <a:prstGeom prst="roundRect">
             <a:avLst>
@@ -11247,7 +11128,7 @@
             <a:pPr algn="ctr"/>
             <a:r>
               <a:rPr lang="fr-FR" sz="2000" b="1"/>
-              <a:t>Optional: Reduce to full-column rank problem</a:t>
+              <a:t>Build the CGM</a:t>
             </a:r>
           </a:p>
         </p:txBody>
@@ -11270,8 +11151,8 @@
         </p:nvCxnSpPr>
         <p:spPr>
           <a:xfrm flipV="1">
-            <a:off x="3293995" y="4524162"/>
-            <a:ext cx="371516" cy="273"/>
+            <a:off x="4645639" y="4524162"/>
+            <a:ext cx="277605" cy="273"/>
           </a:xfrm>
           <a:prstGeom prst="straightConnector1">
             <a:avLst/>
@@ -11309,8 +11190,8 @@
         </p:nvSpPr>
         <p:spPr>
           <a:xfrm>
-            <a:off x="3665512" y="5485920"/>
-            <a:ext cx="3107514" cy="369332"/>
+            <a:off x="4923242" y="5485920"/>
+            <a:ext cx="1849783" cy="369332"/>
           </a:xfrm>
           <a:prstGeom prst="rect">
             <a:avLst/>
@@ -11564,7 +11445,7 @@
         </p:blipFill>
         <p:spPr>
           <a:xfrm>
-            <a:off x="2212988" y="4386061"/>
+            <a:off x="2909674" y="4386061"/>
             <a:ext cx="739943" cy="941552"/>
           </a:xfrm>
           <a:prstGeom prst="rect">
@@ -11594,7 +11475,7 @@
         </p:blipFill>
         <p:spPr>
           <a:xfrm>
-            <a:off x="4849296" y="4386061"/>
+            <a:off x="5480668" y="4386061"/>
             <a:ext cx="739943" cy="941552"/>
           </a:xfrm>
           <a:prstGeom prst="rect">
@@ -11616,7 +11497,7 @@
         </p:nvSpPr>
         <p:spPr>
           <a:xfrm rot="10800000">
-            <a:off x="6066532" y="4720751"/>
+            <a:off x="6175389" y="4786066"/>
             <a:ext cx="1849781" cy="1849781"/>
           </a:xfrm>
           <a:prstGeom prst="circularArrow">

</xml_diff>

<commit_message>
Rewrote MMSYN tutorials 4 and 5
</commit_message>
<xml_diff>
--- a/doc/genome_scale_pipeline/genome_scale_pipeline.pptx
+++ b/doc/genome_scale_pipeline/genome_scale_pipeline.pptx
@@ -202,7 +202,7 @@
           </a:lstStyle>
           <a:p>
             <a:fld id="{49500105-9C48-984E-9CDC-F1375D25D7E6}" type="datetimeFigureOut">
-              <a:t>21/06/2025</a:t>
+              <a:t>23/06/2025</a:t>
             </a:fld>
             <a:endParaRPr lang="fr-FR"/>
           </a:p>
@@ -721,7 +721,7 @@
           <a:lstStyle/>
           <a:p>
             <a:fld id="{7017F4CF-FB7D-E643-B991-A4BE8CDC438F}" type="datetimeFigureOut">
-              <a:t>21/06/2025</a:t>
+              <a:t>23/06/2025</a:t>
             </a:fld>
             <a:endParaRPr lang="fr-FR"/>
           </a:p>
@@ -917,7 +917,7 @@
           <a:lstStyle/>
           <a:p>
             <a:fld id="{7017F4CF-FB7D-E643-B991-A4BE8CDC438F}" type="datetimeFigureOut">
-              <a:t>21/06/2025</a:t>
+              <a:t>23/06/2025</a:t>
             </a:fld>
             <a:endParaRPr lang="fr-FR"/>
           </a:p>
@@ -1123,7 +1123,7 @@
           <a:lstStyle/>
           <a:p>
             <a:fld id="{7017F4CF-FB7D-E643-B991-A4BE8CDC438F}" type="datetimeFigureOut">
-              <a:t>21/06/2025</a:t>
+              <a:t>23/06/2025</a:t>
             </a:fld>
             <a:endParaRPr lang="fr-FR"/>
           </a:p>
@@ -1319,7 +1319,7 @@
           <a:lstStyle/>
           <a:p>
             <a:fld id="{7017F4CF-FB7D-E643-B991-A4BE8CDC438F}" type="datetimeFigureOut">
-              <a:t>21/06/2025</a:t>
+              <a:t>23/06/2025</a:t>
             </a:fld>
             <a:endParaRPr lang="fr-FR"/>
           </a:p>
@@ -1592,7 +1592,7 @@
           <a:lstStyle/>
           <a:p>
             <a:fld id="{7017F4CF-FB7D-E643-B991-A4BE8CDC438F}" type="datetimeFigureOut">
-              <a:t>21/06/2025</a:t>
+              <a:t>23/06/2025</a:t>
             </a:fld>
             <a:endParaRPr lang="fr-FR"/>
           </a:p>
@@ -1855,7 +1855,7 @@
           <a:lstStyle/>
           <a:p>
             <a:fld id="{7017F4CF-FB7D-E643-B991-A4BE8CDC438F}" type="datetimeFigureOut">
-              <a:t>21/06/2025</a:t>
+              <a:t>23/06/2025</a:t>
             </a:fld>
             <a:endParaRPr lang="fr-FR"/>
           </a:p>
@@ -2265,7 +2265,7 @@
           <a:lstStyle/>
           <a:p>
             <a:fld id="{7017F4CF-FB7D-E643-B991-A4BE8CDC438F}" type="datetimeFigureOut">
-              <a:t>21/06/2025</a:t>
+              <a:t>23/06/2025</a:t>
             </a:fld>
             <a:endParaRPr lang="fr-FR"/>
           </a:p>
@@ -2404,7 +2404,7 @@
           <a:lstStyle/>
           <a:p>
             <a:fld id="{7017F4CF-FB7D-E643-B991-A4BE8CDC438F}" type="datetimeFigureOut">
-              <a:t>21/06/2025</a:t>
+              <a:t>23/06/2025</a:t>
             </a:fld>
             <a:endParaRPr lang="fr-FR"/>
           </a:p>
@@ -2515,7 +2515,7 @@
           <a:lstStyle/>
           <a:p>
             <a:fld id="{7017F4CF-FB7D-E643-B991-A4BE8CDC438F}" type="datetimeFigureOut">
-              <a:t>21/06/2025</a:t>
+              <a:t>23/06/2025</a:t>
             </a:fld>
             <a:endParaRPr lang="fr-FR"/>
           </a:p>
@@ -2824,7 +2824,7 @@
           <a:lstStyle/>
           <a:p>
             <a:fld id="{7017F4CF-FB7D-E643-B991-A4BE8CDC438F}" type="datetimeFigureOut">
-              <a:t>21/06/2025</a:t>
+              <a:t>23/06/2025</a:t>
             </a:fld>
             <a:endParaRPr lang="fr-FR"/>
           </a:p>
@@ -3110,7 +3110,7 @@
           <a:lstStyle/>
           <a:p>
             <a:fld id="{7017F4CF-FB7D-E643-B991-A4BE8CDC438F}" type="datetimeFigureOut">
-              <a:t>21/06/2025</a:t>
+              <a:t>23/06/2025</a:t>
             </a:fld>
             <a:endParaRPr lang="fr-FR"/>
           </a:p>
@@ -3349,7 +3349,7 @@
           </a:lstStyle>
           <a:p>
             <a:fld id="{7017F4CF-FB7D-E643-B991-A4BE8CDC438F}" type="datetimeFigureOut">
-              <a:t>21/06/2025</a:t>
+              <a:t>23/06/2025</a:t>
             </a:fld>
             <a:endParaRPr lang="fr-FR"/>
           </a:p>
@@ -7095,8 +7095,8 @@
         </p:nvCxnSpPr>
         <p:spPr>
           <a:xfrm rot="5400000">
-            <a:off x="6294865" y="23615"/>
-            <a:ext cx="387085" cy="6464176"/>
+            <a:off x="6380329" y="109079"/>
+            <a:ext cx="387085" cy="6293249"/>
           </a:xfrm>
           <a:prstGeom prst="bentConnector3">
             <a:avLst>
@@ -7124,48 +7124,6 @@
       </p:cxnSp>
       <p:sp>
         <p:nvSpPr>
-          <p:cNvPr id="9" name="ZoneTexte 8">
-            <a:extLst>
-              <a:ext uri="{FF2B5EF4-FFF2-40B4-BE49-F238E27FC236}">
-                <a16:creationId xmlns:a16="http://schemas.microsoft.com/office/drawing/2014/main" id="{663677EB-A7D7-8D9D-219C-E1589FD0ACAC}"/>
-              </a:ext>
-            </a:extLst>
-          </p:cNvPr>
-          <p:cNvSpPr txBox="1"/>
-          <p:nvPr/>
-        </p:nvSpPr>
-        <p:spPr>
-          <a:xfrm>
-            <a:off x="2782470" y="5865941"/>
-            <a:ext cx="947695" cy="369332"/>
-          </a:xfrm>
-          <a:prstGeom prst="rect">
-            <a:avLst/>
-          </a:prstGeom>
-          <a:noFill/>
-        </p:spPr>
-        <p:txBody>
-          <a:bodyPr wrap="none" rtlCol="0">
-            <a:spAutoFit/>
-          </a:bodyPr>
-          <a:lstStyle/>
-          <a:p>
-            <a:pPr algn="ctr"/>
-            <a:r>
-              <a:rPr lang="fr-FR" b="1">
-                <a:solidFill>
-                  <a:schemeClr val="accent1"/>
-                </a:solidFill>
-                <a:latin typeface="Avenir Black" panose="02000503020000020003" pitchFamily="2" charset="0"/>
-                <a:cs typeface="Beirut" pitchFamily="2" charset="-78"/>
-              </a:rPr>
-              <a:t>STEP 4</a:t>
-            </a:r>
-          </a:p>
-        </p:txBody>
-      </p:sp>
-      <p:sp>
-        <p:nvSpPr>
           <p:cNvPr id="10" name="Rectangle : coins arrondis 9">
             <a:extLst>
               <a:ext uri="{FF2B5EF4-FFF2-40B4-BE49-F238E27FC236}">
@@ -7179,7 +7137,7 @@
         <p:spPr>
           <a:xfrm>
             <a:off x="1868835" y="3449246"/>
-            <a:ext cx="2774967" cy="2388655"/>
+            <a:ext cx="3116822" cy="2388655"/>
           </a:xfrm>
           <a:prstGeom prst="roundRect">
             <a:avLst>
@@ -7227,7 +7185,49 @@
           <a:p>
             <a:r>
               <a:rPr lang="fr-FR"/>
-              <a:t>• Reduce the CGM</a:t>
+              <a:t>• Remove inactive reactions</a:t>
+            </a:r>
+          </a:p>
+        </p:txBody>
+      </p:sp>
+      <p:sp>
+        <p:nvSpPr>
+          <p:cNvPr id="8" name="ZoneTexte 7">
+            <a:extLst>
+              <a:ext uri="{FF2B5EF4-FFF2-40B4-BE49-F238E27FC236}">
+                <a16:creationId xmlns:a16="http://schemas.microsoft.com/office/drawing/2014/main" id="{5767BCE3-2315-7678-7C33-0017CAFA11E8}"/>
+              </a:ext>
+            </a:extLst>
+          </p:cNvPr>
+          <p:cNvSpPr txBox="1"/>
+          <p:nvPr/>
+        </p:nvSpPr>
+        <p:spPr>
+          <a:xfrm>
+            <a:off x="2953398" y="5877426"/>
+            <a:ext cx="947695" cy="369332"/>
+          </a:xfrm>
+          <a:prstGeom prst="rect">
+            <a:avLst/>
+          </a:prstGeom>
+          <a:noFill/>
+        </p:spPr>
+        <p:txBody>
+          <a:bodyPr wrap="none" rtlCol="0">
+            <a:spAutoFit/>
+          </a:bodyPr>
+          <a:lstStyle/>
+          <a:p>
+            <a:pPr algn="ctr"/>
+            <a:r>
+              <a:rPr lang="fr-FR" b="1">
+                <a:solidFill>
+                  <a:schemeClr val="accent1"/>
+                </a:solidFill>
+                <a:latin typeface="Avenir Black" panose="02000503020000020003" pitchFamily="2" charset="0"/>
+                <a:cs typeface="Beirut" pitchFamily="2" charset="-78"/>
+              </a:rPr>
+              <a:t>STEP 4</a:t>
             </a:r>
           </a:p>
         </p:txBody>
@@ -8200,14 +8200,14 @@
           <p:cNvCxnSpPr>
             <a:cxnSpLocks/>
             <a:stCxn id="28" idx="2"/>
-            <a:endCxn id="10" idx="0"/>
+            <a:endCxn id="11" idx="0"/>
           </p:cNvCxnSpPr>
           <p:nvPr/>
         </p:nvCxnSpPr>
         <p:spPr>
           <a:xfrm rot="5400000">
-            <a:off x="6294865" y="23615"/>
-            <a:ext cx="387085" cy="6464176"/>
+            <a:off x="6380329" y="109079"/>
+            <a:ext cx="387085" cy="6293249"/>
           </a:xfrm>
           <a:prstGeom prst="bentConnector3">
             <a:avLst>
@@ -8235,48 +8235,6 @@
       </p:cxnSp>
       <p:sp>
         <p:nvSpPr>
-          <p:cNvPr id="9" name="ZoneTexte 8">
-            <a:extLst>
-              <a:ext uri="{FF2B5EF4-FFF2-40B4-BE49-F238E27FC236}">
-                <a16:creationId xmlns:a16="http://schemas.microsoft.com/office/drawing/2014/main" id="{9EF25429-8795-CDDB-889B-AA91CA9756D8}"/>
-              </a:ext>
-            </a:extLst>
-          </p:cNvPr>
-          <p:cNvSpPr txBox="1"/>
-          <p:nvPr/>
-        </p:nvSpPr>
-        <p:spPr>
-          <a:xfrm>
-            <a:off x="2782470" y="5865941"/>
-            <a:ext cx="947695" cy="369332"/>
-          </a:xfrm>
-          <a:prstGeom prst="rect">
-            <a:avLst/>
-          </a:prstGeom>
-          <a:noFill/>
-        </p:spPr>
-        <p:txBody>
-          <a:bodyPr wrap="none" rtlCol="0">
-            <a:spAutoFit/>
-          </a:bodyPr>
-          <a:lstStyle/>
-          <a:p>
-            <a:pPr algn="ctr"/>
-            <a:r>
-              <a:rPr lang="fr-FR" b="1">
-                <a:solidFill>
-                  <a:schemeClr val="accent1"/>
-                </a:solidFill>
-                <a:latin typeface="Avenir Black" panose="02000503020000020003" pitchFamily="2" charset="0"/>
-                <a:cs typeface="Beirut" pitchFamily="2" charset="-78"/>
-              </a:rPr>
-              <a:t>STEP 4</a:t>
-            </a:r>
-          </a:p>
-        </p:txBody>
-      </p:sp>
-      <p:sp>
-        <p:nvSpPr>
           <p:cNvPr id="7" name="Rectangle : coins arrondis 6">
             <a:extLst>
               <a:ext uri="{FF2B5EF4-FFF2-40B4-BE49-F238E27FC236}">
@@ -8289,7 +8247,7 @@
         </p:nvSpPr>
         <p:spPr>
           <a:xfrm>
-            <a:off x="4976309" y="3449246"/>
+            <a:off x="5268688" y="3449246"/>
             <a:ext cx="2774967" cy="2388655"/>
           </a:xfrm>
           <a:prstGeom prst="roundRect">
@@ -8384,14 +8342,13 @@
           </p:cNvPr>
           <p:cNvCxnSpPr>
             <a:cxnSpLocks/>
-            <a:stCxn id="10" idx="3"/>
             <a:endCxn id="7" idx="1"/>
           </p:cNvCxnSpPr>
           <p:nvPr/>
         </p:nvCxnSpPr>
         <p:spPr>
           <a:xfrm>
-            <a:off x="4643802" y="4643574"/>
+            <a:off x="4936181" y="4643574"/>
             <a:ext cx="332507" cy="0"/>
           </a:xfrm>
           <a:prstGeom prst="straightConnector1">
@@ -8418,52 +8375,10 @@
       </p:cxnSp>
       <p:sp>
         <p:nvSpPr>
-          <p:cNvPr id="17" name="ZoneTexte 16">
-            <a:extLst>
-              <a:ext uri="{FF2B5EF4-FFF2-40B4-BE49-F238E27FC236}">
-                <a16:creationId xmlns:a16="http://schemas.microsoft.com/office/drawing/2014/main" id="{1BA6FF6E-C3FE-0E38-AAD2-9725AE8BDB53}"/>
-              </a:ext>
-            </a:extLst>
-          </p:cNvPr>
-          <p:cNvSpPr txBox="1"/>
-          <p:nvPr/>
-        </p:nvSpPr>
-        <p:spPr>
-          <a:xfrm>
-            <a:off x="5806764" y="5865941"/>
-            <a:ext cx="947695" cy="369332"/>
-          </a:xfrm>
-          <a:prstGeom prst="rect">
-            <a:avLst/>
-          </a:prstGeom>
-          <a:noFill/>
-        </p:spPr>
-        <p:txBody>
-          <a:bodyPr wrap="none" rtlCol="0">
-            <a:spAutoFit/>
-          </a:bodyPr>
-          <a:lstStyle/>
-          <a:p>
-            <a:pPr algn="ctr"/>
-            <a:r>
-              <a:rPr lang="fr-FR" b="1">
-                <a:solidFill>
-                  <a:schemeClr val="accent1"/>
-                </a:solidFill>
-                <a:latin typeface="Avenir Black" panose="02000503020000020003" pitchFamily="2" charset="0"/>
-                <a:cs typeface="Beirut" pitchFamily="2" charset="-78"/>
-              </a:rPr>
-              <a:t>STEP 5</a:t>
-            </a:r>
-          </a:p>
-        </p:txBody>
-      </p:sp>
-      <p:sp>
-        <p:nvSpPr>
-          <p:cNvPr id="10" name="Rectangle : coins arrondis 9">
-            <a:extLst>
-              <a:ext uri="{FF2B5EF4-FFF2-40B4-BE49-F238E27FC236}">
-                <a16:creationId xmlns:a16="http://schemas.microsoft.com/office/drawing/2014/main" id="{8BFA2F0D-248B-EF57-8404-BB2546899D17}"/>
+          <p:cNvPr id="11" name="Rectangle : coins arrondis 10">
+            <a:extLst>
+              <a:ext uri="{FF2B5EF4-FFF2-40B4-BE49-F238E27FC236}">
+                <a16:creationId xmlns:a16="http://schemas.microsoft.com/office/drawing/2014/main" id="{28C462BD-1994-0CD4-4133-099074B42EBC}"/>
               </a:ext>
             </a:extLst>
           </p:cNvPr>
@@ -8473,7 +8388,7 @@
         <p:spPr>
           <a:xfrm>
             <a:off x="1868835" y="3449246"/>
-            <a:ext cx="2774967" cy="2388655"/>
+            <a:ext cx="3116822" cy="2388655"/>
           </a:xfrm>
           <a:prstGeom prst="roundRect">
             <a:avLst>
@@ -8521,7 +8436,91 @@
           <a:p>
             <a:r>
               <a:rPr lang="fr-FR"/>
-              <a:t>• Reduce the CGM</a:t>
+              <a:t>• Remove inactive reactions</a:t>
+            </a:r>
+          </a:p>
+        </p:txBody>
+      </p:sp>
+      <p:sp>
+        <p:nvSpPr>
+          <p:cNvPr id="14" name="ZoneTexte 13">
+            <a:extLst>
+              <a:ext uri="{FF2B5EF4-FFF2-40B4-BE49-F238E27FC236}">
+                <a16:creationId xmlns:a16="http://schemas.microsoft.com/office/drawing/2014/main" id="{EDA66D38-1F71-9E00-553A-A7C2B028725D}"/>
+              </a:ext>
+            </a:extLst>
+          </p:cNvPr>
+          <p:cNvSpPr txBox="1"/>
+          <p:nvPr/>
+        </p:nvSpPr>
+        <p:spPr>
+          <a:xfrm>
+            <a:off x="6099143" y="5887713"/>
+            <a:ext cx="947695" cy="369332"/>
+          </a:xfrm>
+          <a:prstGeom prst="rect">
+            <a:avLst/>
+          </a:prstGeom>
+          <a:noFill/>
+        </p:spPr>
+        <p:txBody>
+          <a:bodyPr wrap="none" rtlCol="0">
+            <a:spAutoFit/>
+          </a:bodyPr>
+          <a:lstStyle/>
+          <a:p>
+            <a:pPr algn="ctr"/>
+            <a:r>
+              <a:rPr lang="fr-FR" b="1">
+                <a:solidFill>
+                  <a:schemeClr val="accent1"/>
+                </a:solidFill>
+                <a:latin typeface="Avenir Black" panose="02000503020000020003" pitchFamily="2" charset="0"/>
+                <a:cs typeface="Beirut" pitchFamily="2" charset="-78"/>
+              </a:rPr>
+              <a:t>STEP 5</a:t>
+            </a:r>
+          </a:p>
+        </p:txBody>
+      </p:sp>
+      <p:sp>
+        <p:nvSpPr>
+          <p:cNvPr id="20" name="ZoneTexte 19">
+            <a:extLst>
+              <a:ext uri="{FF2B5EF4-FFF2-40B4-BE49-F238E27FC236}">
+                <a16:creationId xmlns:a16="http://schemas.microsoft.com/office/drawing/2014/main" id="{D1234A68-04B7-80CB-45E3-27F64799F54C}"/>
+              </a:ext>
+            </a:extLst>
+          </p:cNvPr>
+          <p:cNvSpPr txBox="1"/>
+          <p:nvPr/>
+        </p:nvSpPr>
+        <p:spPr>
+          <a:xfrm>
+            <a:off x="2953398" y="5877426"/>
+            <a:ext cx="947695" cy="369332"/>
+          </a:xfrm>
+          <a:prstGeom prst="rect">
+            <a:avLst/>
+          </a:prstGeom>
+          <a:noFill/>
+        </p:spPr>
+        <p:txBody>
+          <a:bodyPr wrap="none" rtlCol="0">
+            <a:spAutoFit/>
+          </a:bodyPr>
+          <a:lstStyle/>
+          <a:p>
+            <a:pPr algn="ctr"/>
+            <a:r>
+              <a:rPr lang="fr-FR" b="1">
+                <a:solidFill>
+                  <a:schemeClr val="accent1"/>
+                </a:solidFill>
+                <a:latin typeface="Avenir Black" panose="02000503020000020003" pitchFamily="2" charset="0"/>
+                <a:cs typeface="Beirut" pitchFamily="2" charset="-78"/>
+              </a:rPr>
+              <a:t>STEP 4</a:t>
             </a:r>
           </a:p>
         </p:txBody>
@@ -9494,14 +9493,14 @@
           <p:cNvCxnSpPr>
             <a:cxnSpLocks/>
             <a:stCxn id="28" idx="2"/>
-            <a:endCxn id="10" idx="0"/>
+            <a:endCxn id="31" idx="0"/>
           </p:cNvCxnSpPr>
           <p:nvPr/>
         </p:nvCxnSpPr>
         <p:spPr>
           <a:xfrm rot="5400000">
-            <a:off x="6294865" y="23615"/>
-            <a:ext cx="387085" cy="6464176"/>
+            <a:off x="6380329" y="109079"/>
+            <a:ext cx="387085" cy="6293249"/>
           </a:xfrm>
           <a:prstGeom prst="bentConnector3">
             <a:avLst>
@@ -9529,52 +9528,186 @@
       </p:cxnSp>
       <p:sp>
         <p:nvSpPr>
-          <p:cNvPr id="9" name="ZoneTexte 8">
-            <a:extLst>
-              <a:ext uri="{FF2B5EF4-FFF2-40B4-BE49-F238E27FC236}">
-                <a16:creationId xmlns:a16="http://schemas.microsoft.com/office/drawing/2014/main" id="{01F729FB-E23D-1ECB-1541-84E13187EA66}"/>
-              </a:ext>
-            </a:extLst>
-          </p:cNvPr>
-          <p:cNvSpPr txBox="1"/>
+          <p:cNvPr id="3" name="Rectangle : coins arrondis 2">
+            <a:extLst>
+              <a:ext uri="{FF2B5EF4-FFF2-40B4-BE49-F238E27FC236}">
+                <a16:creationId xmlns:a16="http://schemas.microsoft.com/office/drawing/2014/main" id="{A21FD292-8EAA-915E-784D-832F7E2E10FF}"/>
+              </a:ext>
+            </a:extLst>
+          </p:cNvPr>
+          <p:cNvSpPr/>
           <p:nvPr/>
         </p:nvSpPr>
         <p:spPr>
           <a:xfrm>
-            <a:off x="2782470" y="5865941"/>
-            <a:ext cx="947695" cy="369332"/>
+            <a:off x="8490857" y="4015387"/>
+            <a:ext cx="2721549" cy="1361516"/>
+          </a:xfrm>
+          <a:prstGeom prst="roundRect">
+            <a:avLst>
+              <a:gd name="adj" fmla="val 7405"/>
+            </a:avLst>
+          </a:prstGeom>
+          <a:ln/>
+          <a:effectLst>
+            <a:outerShdw blurRad="50800" dist="38100" dir="2700000" algn="tl" rotWithShape="0">
+              <a:prstClr val="black">
+                <a:alpha val="40000"/>
+              </a:prstClr>
+            </a:outerShdw>
+          </a:effectLst>
+        </p:spPr>
+        <p:style>
+          <a:lnRef idx="2">
+            <a:schemeClr val="dk1"/>
+          </a:lnRef>
+          <a:fillRef idx="1">
+            <a:schemeClr val="lt1"/>
+          </a:fillRef>
+          <a:effectRef idx="0">
+            <a:schemeClr val="dk1"/>
+          </a:effectRef>
+          <a:fontRef idx="minor">
+            <a:schemeClr val="dk1"/>
+          </a:fontRef>
+        </p:style>
+        <p:txBody>
+          <a:bodyPr rtlCol="0" anchor="ctr"/>
+          <a:lstStyle/>
+          <a:p>
+            <a:r>
+              <a:rPr lang="fr-FR" sz="2000" b="1"/>
+              <a:t>Consistent</a:t>
+            </a:r>
+          </a:p>
+          <a:p>
+            <a:r>
+              <a:rPr lang="fr-FR" sz="2000" b="1"/>
+              <a:t>genome-scale</a:t>
+            </a:r>
+          </a:p>
+          <a:p>
+            <a:r>
+              <a:rPr lang="fr-FR" sz="2000" b="1"/>
+              <a:t>CGM</a:t>
+            </a:r>
+          </a:p>
+        </p:txBody>
+      </p:sp>
+      <p:sp>
+        <p:nvSpPr>
+          <p:cNvPr id="11" name="Accolade fermante 10">
+            <a:extLst>
+              <a:ext uri="{FF2B5EF4-FFF2-40B4-BE49-F238E27FC236}">
+                <a16:creationId xmlns:a16="http://schemas.microsoft.com/office/drawing/2014/main" id="{61B4BC81-3F1D-5051-2486-30B504941899}"/>
+              </a:ext>
+            </a:extLst>
+          </p:cNvPr>
+          <p:cNvSpPr/>
+          <p:nvPr/>
+        </p:nvSpPr>
+        <p:spPr>
+          <a:xfrm>
+            <a:off x="8141494" y="3598859"/>
+            <a:ext cx="273735" cy="2162841"/>
+          </a:xfrm>
+          <a:prstGeom prst="rightBrace">
+            <a:avLst>
+              <a:gd name="adj1" fmla="val 56598"/>
+              <a:gd name="adj2" fmla="val 50000"/>
+            </a:avLst>
+          </a:prstGeom>
+        </p:spPr>
+        <p:style>
+          <a:lnRef idx="1">
+            <a:schemeClr val="dk1"/>
+          </a:lnRef>
+          <a:fillRef idx="0">
+            <a:schemeClr val="dk1"/>
+          </a:fillRef>
+          <a:effectRef idx="0">
+            <a:schemeClr val="dk1"/>
+          </a:effectRef>
+          <a:fontRef idx="minor">
+            <a:schemeClr val="tx1"/>
+          </a:fontRef>
+        </p:style>
+        <p:txBody>
+          <a:bodyPr rtlCol="0" anchor="ctr"/>
+          <a:lstStyle/>
+          <a:p>
+            <a:pPr algn="ctr"/>
+            <a:endParaRPr lang="fr-FR"/>
+          </a:p>
+        </p:txBody>
+      </p:sp>
+      <p:pic>
+        <p:nvPicPr>
+          <p:cNvPr id="12" name="Picture 2" descr="Free Vectors | Structure of cells">
+            <a:extLst>
+              <a:ext uri="{FF2B5EF4-FFF2-40B4-BE49-F238E27FC236}">
+                <a16:creationId xmlns:a16="http://schemas.microsoft.com/office/drawing/2014/main" id="{07580849-407E-445A-B61F-66A2AD97683E}"/>
+              </a:ext>
+            </a:extLst>
+          </p:cNvPr>
+          <p:cNvPicPr>
+            <a:picLocks noChangeAspect="1" noChangeArrowheads="1"/>
+          </p:cNvPicPr>
+          <p:nvPr/>
+        </p:nvPicPr>
+        <p:blipFill rotWithShape="1">
+          <a:blip r:embed="rId4">
+            <a:duotone>
+              <a:schemeClr val="accent1">
+                <a:shade val="45000"/>
+                <a:satMod val="135000"/>
+              </a:schemeClr>
+              <a:prstClr val="white"/>
+            </a:duotone>
+            <a:extLst>
+              <a:ext uri="{BEBA8EAE-BF5A-486C-A8C5-ECC9F3942E4B}">
+                <a14:imgProps xmlns:a14="http://schemas.microsoft.com/office/drawing/2010/main">
+                  <a14:imgLayer r:embed="rId5">
+                    <a14:imgEffect>
+                      <a14:colorTemperature colorTemp="5300"/>
+                    </a14:imgEffect>
+                  </a14:imgLayer>
+                </a14:imgProps>
+              </a:ext>
+              <a:ext uri="{28A0092B-C50C-407E-A947-70E740481C1C}">
+                <a14:useLocalDpi xmlns:a14="http://schemas.microsoft.com/office/drawing/2010/main" val="0"/>
+              </a:ext>
+            </a:extLst>
+          </a:blip>
+          <a:srcRect l="17567" t="10614" r="17268" b="11437"/>
+          <a:stretch/>
+        </p:blipFill>
+        <p:spPr bwMode="auto">
+          <a:xfrm rot="16200000">
+            <a:off x="10186252" y="4292912"/>
+            <a:ext cx="1011742" cy="855472"/>
           </a:xfrm>
           <a:prstGeom prst="rect">
             <a:avLst/>
           </a:prstGeom>
           <a:noFill/>
+          <a:extLst>
+            <a:ext uri="{909E8E84-426E-40DD-AFC4-6F175D3DCCD1}">
+              <a14:hiddenFill xmlns:a14="http://schemas.microsoft.com/office/drawing/2010/main">
+                <a:solidFill>
+                  <a:srgbClr val="FFFFFF"/>
+                </a:solidFill>
+              </a14:hiddenFill>
+            </a:ext>
+          </a:extLst>
         </p:spPr>
-        <p:txBody>
-          <a:bodyPr wrap="none" rtlCol="0">
-            <a:spAutoFit/>
-          </a:bodyPr>
-          <a:lstStyle/>
-          <a:p>
-            <a:pPr algn="ctr"/>
-            <a:r>
-              <a:rPr lang="fr-FR" b="1">
-                <a:solidFill>
-                  <a:schemeClr val="accent1"/>
-                </a:solidFill>
-                <a:latin typeface="Avenir Black" panose="02000503020000020003" pitchFamily="2" charset="0"/>
-                <a:cs typeface="Beirut" pitchFamily="2" charset="-78"/>
-              </a:rPr>
-              <a:t>STEP 4</a:t>
-            </a:r>
-          </a:p>
-        </p:txBody>
-      </p:sp>
-      <p:sp>
-        <p:nvSpPr>
-          <p:cNvPr id="7" name="Rectangle : coins arrondis 6">
-            <a:extLst>
-              <a:ext uri="{FF2B5EF4-FFF2-40B4-BE49-F238E27FC236}">
-                <a16:creationId xmlns:a16="http://schemas.microsoft.com/office/drawing/2014/main" id="{B6E1A90C-58C7-D38E-86DC-8B2705BF118F}"/>
+      </p:pic>
+      <p:sp>
+        <p:nvSpPr>
+          <p:cNvPr id="14" name="Rectangle : coins arrondis 13">
+            <a:extLst>
+              <a:ext uri="{FF2B5EF4-FFF2-40B4-BE49-F238E27FC236}">
+                <a16:creationId xmlns:a16="http://schemas.microsoft.com/office/drawing/2014/main" id="{DAAA0D8B-B84F-7961-B6AF-C33A70AFD434}"/>
               </a:ext>
             </a:extLst>
           </p:cNvPr>
@@ -9583,7 +9716,7 @@
         </p:nvSpPr>
         <p:spPr>
           <a:xfrm>
-            <a:off x="4976309" y="3449246"/>
+            <a:off x="5268688" y="3449246"/>
             <a:ext cx="2774967" cy="2388655"/>
           </a:xfrm>
           <a:prstGeom prst="roundRect">
@@ -9669,23 +9802,22 @@
       </p:sp>
       <p:cxnSp>
         <p:nvCxnSpPr>
-          <p:cNvPr id="8" name="Connecteur droit avec flèche 7">
-            <a:extLst>
-              <a:ext uri="{FF2B5EF4-FFF2-40B4-BE49-F238E27FC236}">
-                <a16:creationId xmlns:a16="http://schemas.microsoft.com/office/drawing/2014/main" id="{EE0BE8C5-1736-368B-5470-BC9AEB0056F6}"/>
+          <p:cNvPr id="20" name="Connecteur droit avec flèche 19">
+            <a:extLst>
+              <a:ext uri="{FF2B5EF4-FFF2-40B4-BE49-F238E27FC236}">
+                <a16:creationId xmlns:a16="http://schemas.microsoft.com/office/drawing/2014/main" id="{1799B4A0-D032-5DE9-023F-287013DCFE50}"/>
               </a:ext>
             </a:extLst>
           </p:cNvPr>
           <p:cNvCxnSpPr>
             <a:cxnSpLocks/>
-            <a:stCxn id="10" idx="3"/>
-            <a:endCxn id="7" idx="1"/>
+            <a:endCxn id="14" idx="1"/>
           </p:cNvCxnSpPr>
           <p:nvPr/>
         </p:nvCxnSpPr>
         <p:spPr>
           <a:xfrm>
-            <a:off x="4643802" y="4643574"/>
+            <a:off x="4936181" y="4643574"/>
             <a:ext cx="332507" cy="0"/>
           </a:xfrm>
           <a:prstGeom prst="straightConnector1">
@@ -9712,10 +9844,10 @@
       </p:cxnSp>
       <p:sp>
         <p:nvSpPr>
-          <p:cNvPr id="17" name="ZoneTexte 16">
-            <a:extLst>
-              <a:ext uri="{FF2B5EF4-FFF2-40B4-BE49-F238E27FC236}">
-                <a16:creationId xmlns:a16="http://schemas.microsoft.com/office/drawing/2014/main" id="{25B2B035-D5E8-FEE1-F478-49766499D55B}"/>
+          <p:cNvPr id="29" name="ZoneTexte 28">
+            <a:extLst>
+              <a:ext uri="{FF2B5EF4-FFF2-40B4-BE49-F238E27FC236}">
+                <a16:creationId xmlns:a16="http://schemas.microsoft.com/office/drawing/2014/main" id="{59044986-01E8-2E96-852E-F515717D7EB3}"/>
               </a:ext>
             </a:extLst>
           </p:cNvPr>
@@ -9724,7 +9856,7 @@
         </p:nvSpPr>
         <p:spPr>
           <a:xfrm>
-            <a:off x="5806764" y="5865941"/>
+            <a:off x="6099143" y="5887713"/>
             <a:ext cx="947695" cy="369332"/>
           </a:xfrm>
           <a:prstGeom prst="rect">
@@ -9754,10 +9886,52 @@
       </p:sp>
       <p:sp>
         <p:nvSpPr>
-          <p:cNvPr id="10" name="Rectangle : coins arrondis 9">
-            <a:extLst>
-              <a:ext uri="{FF2B5EF4-FFF2-40B4-BE49-F238E27FC236}">
-                <a16:creationId xmlns:a16="http://schemas.microsoft.com/office/drawing/2014/main" id="{22C6B934-E412-3342-27BD-7D5D4EAA27E2}"/>
+          <p:cNvPr id="30" name="ZoneTexte 29">
+            <a:extLst>
+              <a:ext uri="{FF2B5EF4-FFF2-40B4-BE49-F238E27FC236}">
+                <a16:creationId xmlns:a16="http://schemas.microsoft.com/office/drawing/2014/main" id="{D6D16D34-DC6F-289E-7F91-077467DFFA22}"/>
+              </a:ext>
+            </a:extLst>
+          </p:cNvPr>
+          <p:cNvSpPr txBox="1"/>
+          <p:nvPr/>
+        </p:nvSpPr>
+        <p:spPr>
+          <a:xfrm>
+            <a:off x="2953398" y="5877426"/>
+            <a:ext cx="947695" cy="369332"/>
+          </a:xfrm>
+          <a:prstGeom prst="rect">
+            <a:avLst/>
+          </a:prstGeom>
+          <a:noFill/>
+        </p:spPr>
+        <p:txBody>
+          <a:bodyPr wrap="none" rtlCol="0">
+            <a:spAutoFit/>
+          </a:bodyPr>
+          <a:lstStyle/>
+          <a:p>
+            <a:pPr algn="ctr"/>
+            <a:r>
+              <a:rPr lang="fr-FR" b="1">
+                <a:solidFill>
+                  <a:schemeClr val="accent1"/>
+                </a:solidFill>
+                <a:latin typeface="Avenir Black" panose="02000503020000020003" pitchFamily="2" charset="0"/>
+                <a:cs typeface="Beirut" pitchFamily="2" charset="-78"/>
+              </a:rPr>
+              <a:t>STEP 4</a:t>
+            </a:r>
+          </a:p>
+        </p:txBody>
+      </p:sp>
+      <p:sp>
+        <p:nvSpPr>
+          <p:cNvPr id="31" name="Rectangle : coins arrondis 30">
+            <a:extLst>
+              <a:ext uri="{FF2B5EF4-FFF2-40B4-BE49-F238E27FC236}">
+                <a16:creationId xmlns:a16="http://schemas.microsoft.com/office/drawing/2014/main" id="{993C6673-6E77-17A5-6985-6F3CBF8782FC}"/>
               </a:ext>
             </a:extLst>
           </p:cNvPr>
@@ -9767,7 +9941,7 @@
         <p:spPr>
           <a:xfrm>
             <a:off x="1868835" y="3449246"/>
-            <a:ext cx="2774967" cy="2388655"/>
+            <a:ext cx="3116822" cy="2388655"/>
           </a:xfrm>
           <a:prstGeom prst="roundRect">
             <a:avLst>
@@ -9815,187 +9989,11 @@
           <a:p>
             <a:r>
               <a:rPr lang="fr-FR"/>
-              <a:t>• Reduce the CGM</a:t>
-            </a:r>
-          </a:p>
-        </p:txBody>
-      </p:sp>
-      <p:sp>
-        <p:nvSpPr>
-          <p:cNvPr id="3" name="Rectangle : coins arrondis 2">
-            <a:extLst>
-              <a:ext uri="{FF2B5EF4-FFF2-40B4-BE49-F238E27FC236}">
-                <a16:creationId xmlns:a16="http://schemas.microsoft.com/office/drawing/2014/main" id="{A21FD292-8EAA-915E-784D-832F7E2E10FF}"/>
-              </a:ext>
-            </a:extLst>
-          </p:cNvPr>
-          <p:cNvSpPr/>
-          <p:nvPr/>
-        </p:nvSpPr>
-        <p:spPr>
-          <a:xfrm>
-            <a:off x="8406767" y="4015387"/>
-            <a:ext cx="2805639" cy="1361516"/>
-          </a:xfrm>
-          <a:prstGeom prst="roundRect">
-            <a:avLst>
-              <a:gd name="adj" fmla="val 7405"/>
-            </a:avLst>
-          </a:prstGeom>
-          <a:ln/>
-          <a:effectLst>
-            <a:outerShdw blurRad="50800" dist="38100" dir="2700000" algn="tl" rotWithShape="0">
-              <a:prstClr val="black">
-                <a:alpha val="40000"/>
-              </a:prstClr>
-            </a:outerShdw>
-          </a:effectLst>
-        </p:spPr>
-        <p:style>
-          <a:lnRef idx="2">
-            <a:schemeClr val="dk1"/>
-          </a:lnRef>
-          <a:fillRef idx="1">
-            <a:schemeClr val="lt1"/>
-          </a:fillRef>
-          <a:effectRef idx="0">
-            <a:schemeClr val="dk1"/>
-          </a:effectRef>
-          <a:fontRef idx="minor">
-            <a:schemeClr val="dk1"/>
-          </a:fontRef>
-        </p:style>
-        <p:txBody>
-          <a:bodyPr rtlCol="0" anchor="ctr"/>
-          <a:lstStyle/>
-          <a:p>
-            <a:r>
-              <a:rPr lang="fr-FR" sz="2000" b="1"/>
-              <a:t>Consistent</a:t>
-            </a:r>
-          </a:p>
-          <a:p>
-            <a:r>
-              <a:rPr lang="fr-FR" sz="2000" b="1"/>
-              <a:t>genome-scale</a:t>
-            </a:r>
-          </a:p>
-          <a:p>
-            <a:r>
-              <a:rPr lang="fr-FR" sz="2000" b="1"/>
-              <a:t>CGM</a:t>
-            </a:r>
-          </a:p>
-        </p:txBody>
-      </p:sp>
-      <p:sp>
-        <p:nvSpPr>
-          <p:cNvPr id="11" name="Accolade fermante 10">
-            <a:extLst>
-              <a:ext uri="{FF2B5EF4-FFF2-40B4-BE49-F238E27FC236}">
-                <a16:creationId xmlns:a16="http://schemas.microsoft.com/office/drawing/2014/main" id="{61B4BC81-3F1D-5051-2486-30B504941899}"/>
-              </a:ext>
-            </a:extLst>
-          </p:cNvPr>
-          <p:cNvSpPr/>
-          <p:nvPr/>
-        </p:nvSpPr>
-        <p:spPr>
-          <a:xfrm>
-            <a:off x="7871129" y="3598859"/>
-            <a:ext cx="402590" cy="2162841"/>
-          </a:xfrm>
-          <a:prstGeom prst="rightBrace">
-            <a:avLst>
-              <a:gd name="adj1" fmla="val 56598"/>
-              <a:gd name="adj2" fmla="val 50000"/>
-            </a:avLst>
-          </a:prstGeom>
-        </p:spPr>
-        <p:style>
-          <a:lnRef idx="1">
-            <a:schemeClr val="dk1"/>
-          </a:lnRef>
-          <a:fillRef idx="0">
-            <a:schemeClr val="dk1"/>
-          </a:fillRef>
-          <a:effectRef idx="0">
-            <a:schemeClr val="dk1"/>
-          </a:effectRef>
-          <a:fontRef idx="minor">
-            <a:schemeClr val="tx1"/>
-          </a:fontRef>
-        </p:style>
-        <p:txBody>
-          <a:bodyPr rtlCol="0" anchor="ctr"/>
-          <a:lstStyle/>
-          <a:p>
-            <a:pPr algn="ctr"/>
-            <a:endParaRPr lang="fr-FR"/>
-          </a:p>
-        </p:txBody>
-      </p:sp>
-      <p:pic>
-        <p:nvPicPr>
-          <p:cNvPr id="12" name="Picture 2" descr="Free Vectors | Structure of cells">
-            <a:extLst>
-              <a:ext uri="{FF2B5EF4-FFF2-40B4-BE49-F238E27FC236}">
-                <a16:creationId xmlns:a16="http://schemas.microsoft.com/office/drawing/2014/main" id="{07580849-407E-445A-B61F-66A2AD97683E}"/>
-              </a:ext>
-            </a:extLst>
-          </p:cNvPr>
-          <p:cNvPicPr>
-            <a:picLocks noChangeAspect="1" noChangeArrowheads="1"/>
-          </p:cNvPicPr>
-          <p:nvPr/>
-        </p:nvPicPr>
-        <p:blipFill rotWithShape="1">
-          <a:blip r:embed="rId4">
-            <a:duotone>
-              <a:schemeClr val="accent1">
-                <a:shade val="45000"/>
-                <a:satMod val="135000"/>
-              </a:schemeClr>
-              <a:prstClr val="white"/>
-            </a:duotone>
-            <a:extLst>
-              <a:ext uri="{BEBA8EAE-BF5A-486C-A8C5-ECC9F3942E4B}">
-                <a14:imgProps xmlns:a14="http://schemas.microsoft.com/office/drawing/2010/main">
-                  <a14:imgLayer r:embed="rId5">
-                    <a14:imgEffect>
-                      <a14:colorTemperature colorTemp="5300"/>
-                    </a14:imgEffect>
-                  </a14:imgLayer>
-                </a14:imgProps>
-              </a:ext>
-              <a:ext uri="{28A0092B-C50C-407E-A947-70E740481C1C}">
-                <a14:useLocalDpi xmlns:a14="http://schemas.microsoft.com/office/drawing/2010/main" val="0"/>
-              </a:ext>
-            </a:extLst>
-          </a:blip>
-          <a:srcRect l="17567" t="10614" r="17268" b="11437"/>
-          <a:stretch/>
-        </p:blipFill>
-        <p:spPr bwMode="auto">
-          <a:xfrm rot="16200000">
-            <a:off x="10186252" y="4292912"/>
-            <a:ext cx="1011742" cy="855472"/>
-          </a:xfrm>
-          <a:prstGeom prst="rect">
-            <a:avLst/>
-          </a:prstGeom>
-          <a:noFill/>
-          <a:extLst>
-            <a:ext uri="{909E8E84-426E-40DD-AFC4-6F175D3DCCD1}">
-              <a14:hiddenFill xmlns:a14="http://schemas.microsoft.com/office/drawing/2010/main">
-                <a:solidFill>
-                  <a:srgbClr val="FFFFFF"/>
-                </a:solidFill>
-              </a14:hiddenFill>
-            </a:ext>
-          </a:extLst>
-        </p:spPr>
-      </p:pic>
+              <a:t>• Remove inactive reactions</a:t>
+            </a:r>
+          </a:p>
+        </p:txBody>
+      </p:sp>
     </p:spTree>
     <p:extLst>
       <p:ext uri="{BB962C8B-B14F-4D97-AF65-F5344CB8AC3E}">

</xml_diff>

<commit_message>
Removing all mention to CGM acronym
</commit_message>
<xml_diff>
--- a/doc/genome_scale_pipeline/genome_scale_pipeline.pptx
+++ b/doc/genome_scale_pipeline/genome_scale_pipeline.pptx
@@ -202,7 +202,7 @@
           </a:lstStyle>
           <a:p>
             <a:fld id="{49500105-9C48-984E-9CDC-F1375D25D7E6}" type="datetimeFigureOut">
-              <a:t>16/07/2025</a:t>
+              <a:t>27/08/2025</a:t>
             </a:fld>
             <a:endParaRPr lang="fr-FR"/>
           </a:p>
@@ -721,7 +721,7 @@
           <a:lstStyle/>
           <a:p>
             <a:fld id="{7017F4CF-FB7D-E643-B991-A4BE8CDC438F}" type="datetimeFigureOut">
-              <a:t>16/07/2025</a:t>
+              <a:t>27/08/2025</a:t>
             </a:fld>
             <a:endParaRPr lang="fr-FR"/>
           </a:p>
@@ -917,7 +917,7 @@
           <a:lstStyle/>
           <a:p>
             <a:fld id="{7017F4CF-FB7D-E643-B991-A4BE8CDC438F}" type="datetimeFigureOut">
-              <a:t>16/07/2025</a:t>
+              <a:t>27/08/2025</a:t>
             </a:fld>
             <a:endParaRPr lang="fr-FR"/>
           </a:p>
@@ -1123,7 +1123,7 @@
           <a:lstStyle/>
           <a:p>
             <a:fld id="{7017F4CF-FB7D-E643-B991-A4BE8CDC438F}" type="datetimeFigureOut">
-              <a:t>16/07/2025</a:t>
+              <a:t>27/08/2025</a:t>
             </a:fld>
             <a:endParaRPr lang="fr-FR"/>
           </a:p>
@@ -1319,7 +1319,7 @@
           <a:lstStyle/>
           <a:p>
             <a:fld id="{7017F4CF-FB7D-E643-B991-A4BE8CDC438F}" type="datetimeFigureOut">
-              <a:t>16/07/2025</a:t>
+              <a:t>27/08/2025</a:t>
             </a:fld>
             <a:endParaRPr lang="fr-FR"/>
           </a:p>
@@ -1592,7 +1592,7 @@
           <a:lstStyle/>
           <a:p>
             <a:fld id="{7017F4CF-FB7D-E643-B991-A4BE8CDC438F}" type="datetimeFigureOut">
-              <a:t>16/07/2025</a:t>
+              <a:t>27/08/2025</a:t>
             </a:fld>
             <a:endParaRPr lang="fr-FR"/>
           </a:p>
@@ -1855,7 +1855,7 @@
           <a:lstStyle/>
           <a:p>
             <a:fld id="{7017F4CF-FB7D-E643-B991-A4BE8CDC438F}" type="datetimeFigureOut">
-              <a:t>16/07/2025</a:t>
+              <a:t>27/08/2025</a:t>
             </a:fld>
             <a:endParaRPr lang="fr-FR"/>
           </a:p>
@@ -2265,7 +2265,7 @@
           <a:lstStyle/>
           <a:p>
             <a:fld id="{7017F4CF-FB7D-E643-B991-A4BE8CDC438F}" type="datetimeFigureOut">
-              <a:t>16/07/2025</a:t>
+              <a:t>27/08/2025</a:t>
             </a:fld>
             <a:endParaRPr lang="fr-FR"/>
           </a:p>
@@ -2404,7 +2404,7 @@
           <a:lstStyle/>
           <a:p>
             <a:fld id="{7017F4CF-FB7D-E643-B991-A4BE8CDC438F}" type="datetimeFigureOut">
-              <a:t>16/07/2025</a:t>
+              <a:t>27/08/2025</a:t>
             </a:fld>
             <a:endParaRPr lang="fr-FR"/>
           </a:p>
@@ -2515,7 +2515,7 @@
           <a:lstStyle/>
           <a:p>
             <a:fld id="{7017F4CF-FB7D-E643-B991-A4BE8CDC438F}" type="datetimeFigureOut">
-              <a:t>16/07/2025</a:t>
+              <a:t>27/08/2025</a:t>
             </a:fld>
             <a:endParaRPr lang="fr-FR"/>
           </a:p>
@@ -2824,7 +2824,7 @@
           <a:lstStyle/>
           <a:p>
             <a:fld id="{7017F4CF-FB7D-E643-B991-A4BE8CDC438F}" type="datetimeFigureOut">
-              <a:t>16/07/2025</a:t>
+              <a:t>27/08/2025</a:t>
             </a:fld>
             <a:endParaRPr lang="fr-FR"/>
           </a:p>
@@ -3110,7 +3110,7 @@
           <a:lstStyle/>
           <a:p>
             <a:fld id="{7017F4CF-FB7D-E643-B991-A4BE8CDC438F}" type="datetimeFigureOut">
-              <a:t>16/07/2025</a:t>
+              <a:t>27/08/2025</a:t>
             </a:fld>
             <a:endParaRPr lang="fr-FR"/>
           </a:p>
@@ -3349,7 +3349,7 @@
           </a:lstStyle>
           <a:p>
             <a:fld id="{7017F4CF-FB7D-E643-B991-A4BE8CDC438F}" type="datetimeFigureOut">
-              <a:t>16/07/2025</a:t>
+              <a:t>27/08/2025</a:t>
             </a:fld>
             <a:endParaRPr lang="fr-FR"/>
           </a:p>
@@ -8245,7 +8245,7 @@
           <a:p>
             <a:r>
               <a:rPr lang="fr-FR" sz="2000" b="1"/>
-              <a:t>Build the CGM</a:t>
+              <a:t>Build the final model</a:t>
             </a:r>
           </a:p>
           <a:p>
@@ -9535,7 +9535,7 @@
           <a:p>
             <a:r>
               <a:rPr lang="fr-FR" sz="2000" b="1"/>
-              <a:t>CGM</a:t>
+              <a:t>model</a:t>
             </a:r>
           </a:p>
         </p:txBody>
@@ -9699,7 +9699,7 @@
           <a:p>
             <a:r>
               <a:rPr lang="fr-FR" sz="2000" b="1"/>
-              <a:t>Build the CGM</a:t>
+              <a:t>Build the final model</a:t>
             </a:r>
           </a:p>
           <a:p>
@@ -11024,7 +11024,7 @@
             <a:pPr algn="ctr"/>
             <a:r>
               <a:rPr lang="fr-FR" sz="2000" b="1"/>
-              <a:t>Build the CGM</a:t>
+              <a:t>Build the final model</a:t>
             </a:r>
           </a:p>
         </p:txBody>
@@ -11125,8 +11125,8 @@
         </p:nvSpPr>
         <p:spPr>
           <a:xfrm>
-            <a:off x="8811382" y="2648914"/>
-            <a:ext cx="2564554" cy="1361516"/>
+            <a:off x="8811381" y="2648914"/>
+            <a:ext cx="2651275" cy="1361516"/>
           </a:xfrm>
           <a:prstGeom prst="roundRect">
             <a:avLst>
@@ -11162,7 +11162,7 @@
           <a:p>
             <a:r>
               <a:rPr lang="fr-FR" sz="2000" b="1"/>
-              <a:t>Consistent genome-scale CGM</a:t>
+              <a:t>Consistent genome-scale model</a:t>
             </a:r>
           </a:p>
         </p:txBody>

</xml_diff>